<commit_message>
update group project ppt
</commit_message>
<xml_diff>
--- a/hw06/Project6_第32組_小組報告/Project6_第32組.pptx
+++ b/hw06/Project6_第32組_小組報告/Project6_第32組.pptx
@@ -9,15 +9,16 @@
     <p:sldId id="257" r:id="rId3"/>
     <p:sldId id="258" r:id="rId4"/>
     <p:sldId id="259" r:id="rId5"/>
-    <p:sldId id="267" r:id="rId6"/>
-    <p:sldId id="260" r:id="rId7"/>
-    <p:sldId id="261" r:id="rId8"/>
-    <p:sldId id="262" r:id="rId9"/>
-    <p:sldId id="263" r:id="rId10"/>
-    <p:sldId id="264" r:id="rId11"/>
-    <p:sldId id="265" r:id="rId12"/>
-    <p:sldId id="269" r:id="rId13"/>
-    <p:sldId id="270" r:id="rId14"/>
+    <p:sldId id="271" r:id="rId6"/>
+    <p:sldId id="267" r:id="rId7"/>
+    <p:sldId id="260" r:id="rId8"/>
+    <p:sldId id="261" r:id="rId9"/>
+    <p:sldId id="262" r:id="rId10"/>
+    <p:sldId id="263" r:id="rId11"/>
+    <p:sldId id="264" r:id="rId12"/>
+    <p:sldId id="265" r:id="rId13"/>
+    <p:sldId id="269" r:id="rId14"/>
+    <p:sldId id="270" r:id="rId15"/>
   </p:sldIdLst>
   <p:sldSz cx="12192000" cy="6858000"/>
   <p:notesSz cx="6858000" cy="9144000"/>
@@ -212,7 +213,7 @@
           </a:lstStyle>
           <a:p>
             <a:r>
-              <a:rPr lang="zh-TW" altLang="en-US" smtClean="0"/>
+              <a:rPr lang="zh-TW" altLang="en-US"/>
               <a:t>按一下以編輯母片標題樣式</a:t>
             </a:r>
             <a:endParaRPr lang="en-US" dirty="0"/>
@@ -285,7 +286,7 @@
           </a:lstStyle>
           <a:p>
             <a:r>
-              <a:rPr lang="zh-TW" altLang="en-US" smtClean="0"/>
+              <a:rPr lang="zh-TW" altLang="en-US"/>
               <a:t>按一下以編輯母片副標題樣式</a:t>
             </a:r>
             <a:endParaRPr lang="en-US" dirty="0"/>
@@ -309,7 +310,7 @@
           <a:p>
             <a:fld id="{F3176663-7589-4AB8-B988-53967ED54644}" type="datetimeFigureOut">
               <a:rPr lang="zh-TW" altLang="en-US" smtClean="0"/>
-              <a:t>2021/4/19</a:t>
+              <a:t>2021/4/21</a:t>
             </a:fld>
             <a:endParaRPr lang="zh-TW" altLang="en-US"/>
           </a:p>
@@ -367,13 +368,6 @@
   <p:clrMapOvr>
     <a:masterClrMapping/>
   </p:clrMapOvr>
-  <p:timing>
-    <p:tnLst>
-      <p:par>
-        <p:cTn id="1" dur="indefinite" restart="never" nodeType="tmRoot"/>
-      </p:par>
-    </p:tnLst>
-  </p:timing>
 </p:sldLayout>
 </file>
 
@@ -449,7 +443,7 @@
           </a:lstStyle>
           <a:p>
             <a:r>
-              <a:rPr lang="zh-TW" altLang="en-US" smtClean="0"/>
+              <a:rPr lang="zh-TW" altLang="en-US"/>
               <a:t>按一下以編輯母片標題樣式</a:t>
             </a:r>
             <a:endParaRPr lang="en-US" dirty="0"/>
@@ -539,7 +533,7 @@
           </a:lstStyle>
           <a:p>
             <a:r>
-              <a:rPr lang="zh-TW" altLang="en-US" smtClean="0"/>
+              <a:rPr lang="zh-TW" altLang="en-US"/>
               <a:t>按一下圖示以新增圖片</a:t>
             </a:r>
             <a:endParaRPr lang="en-US" dirty="0"/>
@@ -605,7 +599,7 @@
           <a:p>
             <a:pPr lvl="0"/>
             <a:r>
-              <a:rPr lang="zh-TW" altLang="en-US" smtClean="0"/>
+              <a:rPr lang="zh-TW" altLang="en-US"/>
               <a:t>編輯母片文字樣式</a:t>
             </a:r>
           </a:p>
@@ -628,7 +622,7 @@
           <a:p>
             <a:fld id="{F3176663-7589-4AB8-B988-53967ED54644}" type="datetimeFigureOut">
               <a:rPr lang="zh-TW" altLang="en-US" smtClean="0"/>
-              <a:t>2021/4/19</a:t>
+              <a:t>2021/4/21</a:t>
             </a:fld>
             <a:endParaRPr lang="zh-TW" altLang="en-US"/>
           </a:p>
@@ -686,13 +680,6 @@
   <p:clrMapOvr>
     <a:masterClrMapping/>
   </p:clrMapOvr>
-  <p:timing>
-    <p:tnLst>
-      <p:par>
-        <p:cTn id="1" dur="indefinite" restart="never" nodeType="tmRoot"/>
-      </p:par>
-    </p:tnLst>
-  </p:timing>
 </p:sldLayout>
 </file>
 
@@ -768,7 +755,7 @@
           </a:lstStyle>
           <a:p>
             <a:r>
-              <a:rPr lang="zh-TW" altLang="en-US" smtClean="0"/>
+              <a:rPr lang="zh-TW" altLang="en-US"/>
               <a:t>按一下以編輯母片標題樣式</a:t>
             </a:r>
             <a:endParaRPr lang="en-US" dirty="0"/>
@@ -834,7 +821,7 @@
           <a:p>
             <a:pPr lvl="0"/>
             <a:r>
-              <a:rPr lang="zh-TW" altLang="en-US" smtClean="0"/>
+              <a:rPr lang="zh-TW" altLang="en-US"/>
               <a:t>編輯母片文字樣式</a:t>
             </a:r>
           </a:p>
@@ -857,7 +844,7 @@
           <a:p>
             <a:fld id="{F3176663-7589-4AB8-B988-53967ED54644}" type="datetimeFigureOut">
               <a:rPr lang="zh-TW" altLang="en-US" smtClean="0"/>
-              <a:t>2021/4/19</a:t>
+              <a:t>2021/4/21</a:t>
             </a:fld>
             <a:endParaRPr lang="zh-TW" altLang="en-US"/>
           </a:p>
@@ -915,13 +902,6 @@
   <p:clrMapOvr>
     <a:masterClrMapping/>
   </p:clrMapOvr>
-  <p:timing>
-    <p:tnLst>
-      <p:par>
-        <p:cTn id="1" dur="indefinite" restart="never" nodeType="tmRoot"/>
-      </p:par>
-    </p:tnLst>
-  </p:timing>
 </p:sldLayout>
 </file>
 
@@ -997,7 +977,7 @@
           </a:lstStyle>
           <a:p>
             <a:r>
-              <a:rPr lang="zh-TW" altLang="en-US" smtClean="0"/>
+              <a:rPr lang="zh-TW" altLang="en-US"/>
               <a:t>按一下以編輯母片標題樣式</a:t>
             </a:r>
             <a:endParaRPr lang="en-US" dirty="0"/>
@@ -1065,7 +1045,7 @@
           <a:p>
             <a:pPr lvl="0"/>
             <a:r>
-              <a:rPr lang="zh-TW" altLang="en-US" smtClean="0"/>
+              <a:rPr lang="zh-TW" altLang="en-US"/>
               <a:t>編輯母片文字樣式</a:t>
             </a:r>
           </a:p>
@@ -1132,7 +1112,7 @@
           <a:p>
             <a:pPr lvl="0"/>
             <a:r>
-              <a:rPr lang="zh-TW" altLang="en-US" smtClean="0"/>
+              <a:rPr lang="zh-TW" altLang="en-US"/>
               <a:t>編輯母片文字樣式</a:t>
             </a:r>
           </a:p>
@@ -1155,7 +1135,7 @@
           <a:p>
             <a:fld id="{F3176663-7589-4AB8-B988-53967ED54644}" type="datetimeFigureOut">
               <a:rPr lang="zh-TW" altLang="en-US" smtClean="0"/>
-              <a:t>2021/4/19</a:t>
+              <a:t>2021/4/21</a:t>
             </a:fld>
             <a:endParaRPr lang="zh-TW" altLang="en-US"/>
           </a:p>
@@ -1445,13 +1425,6 @@
   <p:clrMapOvr>
     <a:masterClrMapping/>
   </p:clrMapOvr>
-  <p:timing>
-    <p:tnLst>
-      <p:par>
-        <p:cTn id="1" dur="indefinite" restart="never" nodeType="tmRoot"/>
-      </p:par>
-    </p:tnLst>
-  </p:timing>
 </p:sldLayout>
 </file>
 
@@ -1527,7 +1500,7 @@
           </a:lstStyle>
           <a:p>
             <a:r>
-              <a:rPr lang="zh-TW" altLang="en-US" smtClean="0"/>
+              <a:rPr lang="zh-TW" altLang="en-US"/>
               <a:t>按一下以編輯母片標題樣式</a:t>
             </a:r>
             <a:endParaRPr lang="en-US" dirty="0"/>
@@ -1593,7 +1566,7 @@
           <a:p>
             <a:pPr lvl="0"/>
             <a:r>
-              <a:rPr lang="zh-TW" altLang="en-US" smtClean="0"/>
+              <a:rPr lang="zh-TW" altLang="en-US"/>
               <a:t>編輯母片文字樣式</a:t>
             </a:r>
           </a:p>
@@ -1616,7 +1589,7 @@
           <a:p>
             <a:fld id="{F3176663-7589-4AB8-B988-53967ED54644}" type="datetimeFigureOut">
               <a:rPr lang="zh-TW" altLang="en-US" smtClean="0"/>
-              <a:t>2021/4/19</a:t>
+              <a:t>2021/4/21</a:t>
             </a:fld>
             <a:endParaRPr lang="zh-TW" altLang="en-US"/>
           </a:p>
@@ -1745,7 +1718,7 @@
           <a:lstStyle/>
           <a:p>
             <a:r>
-              <a:rPr lang="zh-TW" altLang="en-US" smtClean="0"/>
+              <a:rPr lang="zh-TW" altLang="en-US"/>
               <a:t>按一下以編輯母片標題樣式</a:t>
             </a:r>
             <a:endParaRPr lang="en-US" dirty="0"/>
@@ -1820,7 +1793,7 @@
           <a:p>
             <a:pPr lvl="0"/>
             <a:r>
-              <a:rPr lang="zh-TW" altLang="en-US" smtClean="0"/>
+              <a:rPr lang="zh-TW" altLang="en-US"/>
               <a:t>編輯母片文字樣式</a:t>
             </a:r>
           </a:p>
@@ -1887,7 +1860,7 @@
           <a:p>
             <a:pPr lvl="0"/>
             <a:r>
-              <a:rPr lang="zh-TW" altLang="en-US" smtClean="0"/>
+              <a:rPr lang="zh-TW" altLang="en-US"/>
               <a:t>編輯母片文字樣式</a:t>
             </a:r>
           </a:p>
@@ -1961,7 +1934,7 @@
           <a:p>
             <a:pPr lvl="0"/>
             <a:r>
-              <a:rPr lang="zh-TW" altLang="en-US" smtClean="0"/>
+              <a:rPr lang="zh-TW" altLang="en-US"/>
               <a:t>編輯母片文字樣式</a:t>
             </a:r>
           </a:p>
@@ -2028,7 +2001,7 @@
           <a:p>
             <a:pPr lvl="0"/>
             <a:r>
-              <a:rPr lang="zh-TW" altLang="en-US" smtClean="0"/>
+              <a:rPr lang="zh-TW" altLang="en-US"/>
               <a:t>編輯母片文字樣式</a:t>
             </a:r>
           </a:p>
@@ -2102,7 +2075,7 @@
           <a:p>
             <a:pPr lvl="0"/>
             <a:r>
-              <a:rPr lang="zh-TW" altLang="en-US" smtClean="0"/>
+              <a:rPr lang="zh-TW" altLang="en-US"/>
               <a:t>編輯母片文字樣式</a:t>
             </a:r>
           </a:p>
@@ -2169,7 +2142,7 @@
           <a:p>
             <a:pPr lvl="0"/>
             <a:r>
-              <a:rPr lang="zh-TW" altLang="en-US" smtClean="0"/>
+              <a:rPr lang="zh-TW" altLang="en-US"/>
               <a:t>編輯母片文字樣式</a:t>
             </a:r>
           </a:p>
@@ -2192,7 +2165,7 @@
           <a:p>
             <a:fld id="{F3176663-7589-4AB8-B988-53967ED54644}" type="datetimeFigureOut">
               <a:rPr lang="zh-TW" altLang="en-US" smtClean="0"/>
-              <a:t>2021/4/19</a:t>
+              <a:t>2021/4/21</a:t>
             </a:fld>
             <a:endParaRPr lang="zh-TW" altLang="en-US"/>
           </a:p>
@@ -2321,7 +2294,7 @@
           <a:lstStyle/>
           <a:p>
             <a:r>
-              <a:rPr lang="zh-TW" altLang="en-US" smtClean="0"/>
+              <a:rPr lang="zh-TW" altLang="en-US"/>
               <a:t>按一下以編輯母片標題樣式</a:t>
             </a:r>
             <a:endParaRPr lang="en-US" dirty="0"/>
@@ -2396,7 +2369,7 @@
           <a:p>
             <a:pPr lvl="0"/>
             <a:r>
-              <a:rPr lang="zh-TW" altLang="en-US" smtClean="0"/>
+              <a:rPr lang="zh-TW" altLang="en-US"/>
               <a:t>編輯母片文字樣式</a:t>
             </a:r>
           </a:p>
@@ -2487,7 +2460,7 @@
           </a:lstStyle>
           <a:p>
             <a:r>
-              <a:rPr lang="zh-TW" altLang="en-US" smtClean="0"/>
+              <a:rPr lang="zh-TW" altLang="en-US"/>
               <a:t>按一下圖示以新增圖片</a:t>
             </a:r>
             <a:endParaRPr lang="en-US" dirty="0"/>
@@ -2555,7 +2528,7 @@
           <a:p>
             <a:pPr lvl="0"/>
             <a:r>
-              <a:rPr lang="zh-TW" altLang="en-US" smtClean="0"/>
+              <a:rPr lang="zh-TW" altLang="en-US"/>
               <a:t>編輯母片文字樣式</a:t>
             </a:r>
           </a:p>
@@ -2629,7 +2602,7 @@
           <a:p>
             <a:pPr lvl="0"/>
             <a:r>
-              <a:rPr lang="zh-TW" altLang="en-US" smtClean="0"/>
+              <a:rPr lang="zh-TW" altLang="en-US"/>
               <a:t>編輯母片文字樣式</a:t>
             </a:r>
           </a:p>
@@ -2720,7 +2693,7 @@
           </a:lstStyle>
           <a:p>
             <a:r>
-              <a:rPr lang="zh-TW" altLang="en-US" smtClean="0"/>
+              <a:rPr lang="zh-TW" altLang="en-US"/>
               <a:t>按一下圖示以新增圖片</a:t>
             </a:r>
             <a:endParaRPr lang="en-US" dirty="0"/>
@@ -2788,7 +2761,7 @@
           <a:p>
             <a:pPr lvl="0"/>
             <a:r>
-              <a:rPr lang="zh-TW" altLang="en-US" smtClean="0"/>
+              <a:rPr lang="zh-TW" altLang="en-US"/>
               <a:t>編輯母片文字樣式</a:t>
             </a:r>
           </a:p>
@@ -2862,7 +2835,7 @@
           <a:p>
             <a:pPr lvl="0"/>
             <a:r>
-              <a:rPr lang="zh-TW" altLang="en-US" smtClean="0"/>
+              <a:rPr lang="zh-TW" altLang="en-US"/>
               <a:t>編輯母片文字樣式</a:t>
             </a:r>
           </a:p>
@@ -2953,7 +2926,7 @@
           </a:lstStyle>
           <a:p>
             <a:r>
-              <a:rPr lang="zh-TW" altLang="en-US" smtClean="0"/>
+              <a:rPr lang="zh-TW" altLang="en-US"/>
               <a:t>按一下圖示以新增圖片</a:t>
             </a:r>
             <a:endParaRPr lang="en-US" dirty="0"/>
@@ -3021,7 +2994,7 @@
           <a:p>
             <a:pPr lvl="0"/>
             <a:r>
-              <a:rPr lang="zh-TW" altLang="en-US" smtClean="0"/>
+              <a:rPr lang="zh-TW" altLang="en-US"/>
               <a:t>編輯母片文字樣式</a:t>
             </a:r>
           </a:p>
@@ -3044,7 +3017,7 @@
           <a:p>
             <a:fld id="{F3176663-7589-4AB8-B988-53967ED54644}" type="datetimeFigureOut">
               <a:rPr lang="zh-TW" altLang="en-US" smtClean="0"/>
-              <a:t>2021/4/19</a:t>
+              <a:t>2021/4/21</a:t>
             </a:fld>
             <a:endParaRPr lang="zh-TW" altLang="en-US"/>
           </a:p>
@@ -3168,7 +3141,7 @@
           <a:lstStyle/>
           <a:p>
             <a:r>
-              <a:rPr lang="zh-TW" altLang="en-US" smtClean="0"/>
+              <a:rPr lang="zh-TW" altLang="en-US"/>
               <a:t>按一下以編輯母片標題樣式</a:t>
             </a:r>
             <a:endParaRPr lang="en-US" dirty="0"/>
@@ -3197,35 +3170,35 @@
           <a:p>
             <a:pPr lvl="0"/>
             <a:r>
-              <a:rPr lang="zh-TW" altLang="en-US" smtClean="0"/>
+              <a:rPr lang="zh-TW" altLang="en-US"/>
               <a:t>編輯母片文字樣式</a:t>
             </a:r>
           </a:p>
           <a:p>
             <a:pPr lvl="1"/>
             <a:r>
-              <a:rPr lang="zh-TW" altLang="en-US" smtClean="0"/>
+              <a:rPr lang="zh-TW" altLang="en-US"/>
               <a:t>第二層</a:t>
             </a:r>
           </a:p>
           <a:p>
             <a:pPr lvl="2"/>
             <a:r>
-              <a:rPr lang="zh-TW" altLang="en-US" smtClean="0"/>
+              <a:rPr lang="zh-TW" altLang="en-US"/>
               <a:t>第三層</a:t>
             </a:r>
           </a:p>
           <a:p>
             <a:pPr lvl="3"/>
             <a:r>
-              <a:rPr lang="zh-TW" altLang="en-US" smtClean="0"/>
+              <a:rPr lang="zh-TW" altLang="en-US"/>
               <a:t>第四層</a:t>
             </a:r>
           </a:p>
           <a:p>
             <a:pPr lvl="4"/>
             <a:r>
-              <a:rPr lang="zh-TW" altLang="en-US" smtClean="0"/>
+              <a:rPr lang="zh-TW" altLang="en-US"/>
               <a:t>第五層</a:t>
             </a:r>
             <a:endParaRPr lang="en-US" dirty="0"/>
@@ -3249,7 +3222,7 @@
           <a:p>
             <a:fld id="{F3176663-7589-4AB8-B988-53967ED54644}" type="datetimeFigureOut">
               <a:rPr lang="zh-TW" altLang="en-US" smtClean="0"/>
-              <a:t>2021/4/19</a:t>
+              <a:t>2021/4/21</a:t>
             </a:fld>
             <a:endParaRPr lang="zh-TW" altLang="en-US"/>
           </a:p>
@@ -3382,7 +3355,7 @@
           </a:lstStyle>
           <a:p>
             <a:r>
-              <a:rPr lang="zh-TW" altLang="en-US" smtClean="0"/>
+              <a:rPr lang="zh-TW" altLang="en-US"/>
               <a:t>按一下以編輯母片標題樣式</a:t>
             </a:r>
             <a:endParaRPr lang="en-US" dirty="0"/>
@@ -3411,35 +3384,35 @@
           <a:p>
             <a:pPr lvl="0"/>
             <a:r>
-              <a:rPr lang="zh-TW" altLang="en-US" smtClean="0"/>
+              <a:rPr lang="zh-TW" altLang="en-US"/>
               <a:t>編輯母片文字樣式</a:t>
             </a:r>
           </a:p>
           <a:p>
             <a:pPr lvl="1"/>
             <a:r>
-              <a:rPr lang="zh-TW" altLang="en-US" smtClean="0"/>
+              <a:rPr lang="zh-TW" altLang="en-US"/>
               <a:t>第二層</a:t>
             </a:r>
           </a:p>
           <a:p>
             <a:pPr lvl="2"/>
             <a:r>
-              <a:rPr lang="zh-TW" altLang="en-US" smtClean="0"/>
+              <a:rPr lang="zh-TW" altLang="en-US"/>
               <a:t>第三層</a:t>
             </a:r>
           </a:p>
           <a:p>
             <a:pPr lvl="3"/>
             <a:r>
-              <a:rPr lang="zh-TW" altLang="en-US" smtClean="0"/>
+              <a:rPr lang="zh-TW" altLang="en-US"/>
               <a:t>第四層</a:t>
             </a:r>
           </a:p>
           <a:p>
             <a:pPr lvl="4"/>
             <a:r>
-              <a:rPr lang="zh-TW" altLang="en-US" smtClean="0"/>
+              <a:rPr lang="zh-TW" altLang="en-US"/>
               <a:t>第五層</a:t>
             </a:r>
             <a:endParaRPr lang="en-US" dirty="0"/>
@@ -3463,7 +3436,7 @@
           <a:p>
             <a:fld id="{F3176663-7589-4AB8-B988-53967ED54644}" type="datetimeFigureOut">
               <a:rPr lang="zh-TW" altLang="en-US" smtClean="0"/>
-              <a:t>2021/4/19</a:t>
+              <a:t>2021/4/21</a:t>
             </a:fld>
             <a:endParaRPr lang="zh-TW" altLang="en-US"/>
           </a:p>
@@ -3601,7 +3574,7 @@
           <a:lstStyle/>
           <a:p>
             <a:r>
-              <a:rPr lang="zh-TW" altLang="en-US" smtClean="0"/>
+              <a:rPr lang="zh-TW" altLang="en-US"/>
               <a:t>按一下以編輯母片標題樣式</a:t>
             </a:r>
             <a:endParaRPr lang="en-US" dirty="0"/>
@@ -3630,35 +3603,35 @@
           <a:p>
             <a:pPr lvl="0"/>
             <a:r>
-              <a:rPr lang="zh-TW" altLang="en-US" smtClean="0"/>
+              <a:rPr lang="zh-TW" altLang="en-US"/>
               <a:t>編輯母片文字樣式</a:t>
             </a:r>
           </a:p>
           <a:p>
             <a:pPr lvl="1"/>
             <a:r>
-              <a:rPr lang="zh-TW" altLang="en-US" smtClean="0"/>
+              <a:rPr lang="zh-TW" altLang="en-US"/>
               <a:t>第二層</a:t>
             </a:r>
           </a:p>
           <a:p>
             <a:pPr lvl="2"/>
             <a:r>
-              <a:rPr lang="zh-TW" altLang="en-US" smtClean="0"/>
+              <a:rPr lang="zh-TW" altLang="en-US"/>
               <a:t>第三層</a:t>
             </a:r>
           </a:p>
           <a:p>
             <a:pPr lvl="3"/>
             <a:r>
-              <a:rPr lang="zh-TW" altLang="en-US" smtClean="0"/>
+              <a:rPr lang="zh-TW" altLang="en-US"/>
               <a:t>第四層</a:t>
             </a:r>
           </a:p>
           <a:p>
             <a:pPr lvl="4"/>
             <a:r>
-              <a:rPr lang="zh-TW" altLang="en-US" smtClean="0"/>
+              <a:rPr lang="zh-TW" altLang="en-US"/>
               <a:t>第五層</a:t>
             </a:r>
             <a:endParaRPr lang="en-US" dirty="0"/>
@@ -3682,7 +3655,7 @@
           <a:p>
             <a:fld id="{F3176663-7589-4AB8-B988-53967ED54644}" type="datetimeFigureOut">
               <a:rPr lang="zh-TW" altLang="en-US" smtClean="0"/>
-              <a:t>2021/4/19</a:t>
+              <a:t>2021/4/21</a:t>
             </a:fld>
             <a:endParaRPr lang="zh-TW" altLang="en-US"/>
           </a:p>
@@ -3740,13 +3713,6 @@
   <p:clrMapOvr>
     <a:masterClrMapping/>
   </p:clrMapOvr>
-  <p:timing>
-    <p:tnLst>
-      <p:par>
-        <p:cTn id="1" dur="indefinite" restart="never" nodeType="tmRoot"/>
-      </p:par>
-    </p:tnLst>
-  </p:timing>
 </p:sldLayout>
 </file>
 
@@ -3838,7 +3804,7 @@
           </a:lstStyle>
           <a:p>
             <a:r>
-              <a:rPr lang="zh-TW" altLang="en-US" smtClean="0"/>
+              <a:rPr lang="zh-TW" altLang="en-US"/>
               <a:t>按一下以編輯母片標題樣式</a:t>
             </a:r>
             <a:endParaRPr lang="en-US" dirty="0"/>
@@ -3960,7 +3926,7 @@
           <a:p>
             <a:pPr lvl="0"/>
             <a:r>
-              <a:rPr lang="zh-TW" altLang="en-US" smtClean="0"/>
+              <a:rPr lang="zh-TW" altLang="en-US"/>
               <a:t>編輯母片文字樣式</a:t>
             </a:r>
           </a:p>
@@ -3983,7 +3949,7 @@
           <a:p>
             <a:fld id="{F3176663-7589-4AB8-B988-53967ED54644}" type="datetimeFigureOut">
               <a:rPr lang="zh-TW" altLang="en-US" smtClean="0"/>
-              <a:t>2021/4/19</a:t>
+              <a:t>2021/4/21</a:t>
             </a:fld>
             <a:endParaRPr lang="zh-TW" altLang="en-US"/>
           </a:p>
@@ -4041,13 +4007,6 @@
   <p:clrMapOvr>
     <a:masterClrMapping/>
   </p:clrMapOvr>
-  <p:timing>
-    <p:tnLst>
-      <p:par>
-        <p:cTn id="1" dur="indefinite" restart="never" nodeType="tmRoot"/>
-      </p:par>
-    </p:tnLst>
-  </p:timing>
 </p:sldLayout>
 </file>
 
@@ -4119,7 +4078,7 @@
           <a:lstStyle/>
           <a:p>
             <a:r>
-              <a:rPr lang="zh-TW" altLang="en-US" smtClean="0"/>
+              <a:rPr lang="zh-TW" altLang="en-US"/>
               <a:t>按一下以編輯母片標題樣式</a:t>
             </a:r>
             <a:endParaRPr lang="en-US" dirty="0"/>
@@ -4148,35 +4107,35 @@
           <a:p>
             <a:pPr lvl="0"/>
             <a:r>
-              <a:rPr lang="zh-TW" altLang="en-US" smtClean="0"/>
+              <a:rPr lang="zh-TW" altLang="en-US"/>
               <a:t>編輯母片文字樣式</a:t>
             </a:r>
           </a:p>
           <a:p>
             <a:pPr lvl="1"/>
             <a:r>
-              <a:rPr lang="zh-TW" altLang="en-US" smtClean="0"/>
+              <a:rPr lang="zh-TW" altLang="en-US"/>
               <a:t>第二層</a:t>
             </a:r>
           </a:p>
           <a:p>
             <a:pPr lvl="2"/>
             <a:r>
-              <a:rPr lang="zh-TW" altLang="en-US" smtClean="0"/>
+              <a:rPr lang="zh-TW" altLang="en-US"/>
               <a:t>第三層</a:t>
             </a:r>
           </a:p>
           <a:p>
             <a:pPr lvl="3"/>
             <a:r>
-              <a:rPr lang="zh-TW" altLang="en-US" smtClean="0"/>
+              <a:rPr lang="zh-TW" altLang="en-US"/>
               <a:t>第四層</a:t>
             </a:r>
           </a:p>
           <a:p>
             <a:pPr lvl="4"/>
             <a:r>
-              <a:rPr lang="zh-TW" altLang="en-US" smtClean="0"/>
+              <a:rPr lang="zh-TW" altLang="en-US"/>
               <a:t>第五層</a:t>
             </a:r>
             <a:endParaRPr lang="en-US" dirty="0"/>
@@ -4205,35 +4164,35 @@
           <a:p>
             <a:pPr lvl="0"/>
             <a:r>
-              <a:rPr lang="zh-TW" altLang="en-US" smtClean="0"/>
+              <a:rPr lang="zh-TW" altLang="en-US"/>
               <a:t>編輯母片文字樣式</a:t>
             </a:r>
           </a:p>
           <a:p>
             <a:pPr lvl="1"/>
             <a:r>
-              <a:rPr lang="zh-TW" altLang="en-US" smtClean="0"/>
+              <a:rPr lang="zh-TW" altLang="en-US"/>
               <a:t>第二層</a:t>
             </a:r>
           </a:p>
           <a:p>
             <a:pPr lvl="2"/>
             <a:r>
-              <a:rPr lang="zh-TW" altLang="en-US" smtClean="0"/>
+              <a:rPr lang="zh-TW" altLang="en-US"/>
               <a:t>第三層</a:t>
             </a:r>
           </a:p>
           <a:p>
             <a:pPr lvl="3"/>
             <a:r>
-              <a:rPr lang="zh-TW" altLang="en-US" smtClean="0"/>
+              <a:rPr lang="zh-TW" altLang="en-US"/>
               <a:t>第四層</a:t>
             </a:r>
           </a:p>
           <a:p>
             <a:pPr lvl="4"/>
             <a:r>
-              <a:rPr lang="zh-TW" altLang="en-US" smtClean="0"/>
+              <a:rPr lang="zh-TW" altLang="en-US"/>
               <a:t>第五層</a:t>
             </a:r>
             <a:endParaRPr lang="en-US" dirty="0"/>
@@ -4257,7 +4216,7 @@
           <a:p>
             <a:fld id="{F3176663-7589-4AB8-B988-53967ED54644}" type="datetimeFigureOut">
               <a:rPr lang="zh-TW" altLang="en-US" smtClean="0"/>
-              <a:t>2021/4/19</a:t>
+              <a:t>2021/4/21</a:t>
             </a:fld>
             <a:endParaRPr lang="zh-TW" altLang="en-US"/>
           </a:p>
@@ -4315,13 +4274,6 @@
   <p:clrMapOvr>
     <a:masterClrMapping/>
   </p:clrMapOvr>
-  <p:timing>
-    <p:tnLst>
-      <p:par>
-        <p:cTn id="1" dur="indefinite" restart="never" nodeType="tmRoot"/>
-      </p:par>
-    </p:tnLst>
-  </p:timing>
 </p:sldLayout>
 </file>
 
@@ -4393,7 +4345,7 @@
           <a:lstStyle/>
           <a:p>
             <a:r>
-              <a:rPr lang="zh-TW" altLang="en-US" smtClean="0"/>
+              <a:rPr lang="zh-TW" altLang="en-US"/>
               <a:t>按一下以編輯母片標題樣式</a:t>
             </a:r>
             <a:endParaRPr lang="en-US" dirty="0"/>
@@ -4468,7 +4420,7 @@
           <a:p>
             <a:pPr lvl="0"/>
             <a:r>
-              <a:rPr lang="zh-TW" altLang="en-US" smtClean="0"/>
+              <a:rPr lang="zh-TW" altLang="en-US"/>
               <a:t>編輯母片文字樣式</a:t>
             </a:r>
           </a:p>
@@ -4496,35 +4448,35 @@
           <a:p>
             <a:pPr lvl="0"/>
             <a:r>
-              <a:rPr lang="zh-TW" altLang="en-US" smtClean="0"/>
+              <a:rPr lang="zh-TW" altLang="en-US"/>
               <a:t>編輯母片文字樣式</a:t>
             </a:r>
           </a:p>
           <a:p>
             <a:pPr lvl="1"/>
             <a:r>
-              <a:rPr lang="zh-TW" altLang="en-US" smtClean="0"/>
+              <a:rPr lang="zh-TW" altLang="en-US"/>
               <a:t>第二層</a:t>
             </a:r>
           </a:p>
           <a:p>
             <a:pPr lvl="2"/>
             <a:r>
-              <a:rPr lang="zh-TW" altLang="en-US" smtClean="0"/>
+              <a:rPr lang="zh-TW" altLang="en-US"/>
               <a:t>第三層</a:t>
             </a:r>
           </a:p>
           <a:p>
             <a:pPr lvl="3"/>
             <a:r>
-              <a:rPr lang="zh-TW" altLang="en-US" smtClean="0"/>
+              <a:rPr lang="zh-TW" altLang="en-US"/>
               <a:t>第四層</a:t>
             </a:r>
           </a:p>
           <a:p>
             <a:pPr lvl="4"/>
             <a:r>
-              <a:rPr lang="zh-TW" altLang="en-US" smtClean="0"/>
+              <a:rPr lang="zh-TW" altLang="en-US"/>
               <a:t>第五層</a:t>
             </a:r>
             <a:endParaRPr lang="en-US" dirty="0"/>
@@ -4599,7 +4551,7 @@
           <a:p>
             <a:pPr lvl="0"/>
             <a:r>
-              <a:rPr lang="zh-TW" altLang="en-US" smtClean="0"/>
+              <a:rPr lang="zh-TW" altLang="en-US"/>
               <a:t>編輯母片文字樣式</a:t>
             </a:r>
           </a:p>
@@ -4627,35 +4579,35 @@
           <a:p>
             <a:pPr lvl="0"/>
             <a:r>
-              <a:rPr lang="zh-TW" altLang="en-US" smtClean="0"/>
+              <a:rPr lang="zh-TW" altLang="en-US"/>
               <a:t>編輯母片文字樣式</a:t>
             </a:r>
           </a:p>
           <a:p>
             <a:pPr lvl="1"/>
             <a:r>
-              <a:rPr lang="zh-TW" altLang="en-US" smtClean="0"/>
+              <a:rPr lang="zh-TW" altLang="en-US"/>
               <a:t>第二層</a:t>
             </a:r>
           </a:p>
           <a:p>
             <a:pPr lvl="2"/>
             <a:r>
-              <a:rPr lang="zh-TW" altLang="en-US" smtClean="0"/>
+              <a:rPr lang="zh-TW" altLang="en-US"/>
               <a:t>第三層</a:t>
             </a:r>
           </a:p>
           <a:p>
             <a:pPr lvl="3"/>
             <a:r>
-              <a:rPr lang="zh-TW" altLang="en-US" smtClean="0"/>
+              <a:rPr lang="zh-TW" altLang="en-US"/>
               <a:t>第四層</a:t>
             </a:r>
           </a:p>
           <a:p>
             <a:pPr lvl="4"/>
             <a:r>
-              <a:rPr lang="zh-TW" altLang="en-US" smtClean="0"/>
+              <a:rPr lang="zh-TW" altLang="en-US"/>
               <a:t>第五層</a:t>
             </a:r>
             <a:endParaRPr lang="en-US" dirty="0"/>
@@ -4679,7 +4631,7 @@
           <a:p>
             <a:fld id="{F3176663-7589-4AB8-B988-53967ED54644}" type="datetimeFigureOut">
               <a:rPr lang="zh-TW" altLang="en-US" smtClean="0"/>
-              <a:t>2021/4/19</a:t>
+              <a:t>2021/4/21</a:t>
             </a:fld>
             <a:endParaRPr lang="zh-TW" altLang="en-US"/>
           </a:p>
@@ -4737,13 +4689,6 @@
   <p:clrMapOvr>
     <a:masterClrMapping/>
   </p:clrMapOvr>
-  <p:timing>
-    <p:tnLst>
-      <p:par>
-        <p:cTn id="1" dur="indefinite" restart="never" nodeType="tmRoot"/>
-      </p:par>
-    </p:tnLst>
-  </p:timing>
 </p:sldLayout>
 </file>
 
@@ -4810,7 +4755,7 @@
           <a:lstStyle/>
           <a:p>
             <a:r>
-              <a:rPr lang="zh-TW" altLang="en-US" smtClean="0"/>
+              <a:rPr lang="zh-TW" altLang="en-US"/>
               <a:t>按一下以編輯母片標題樣式</a:t>
             </a:r>
             <a:endParaRPr lang="en-US" dirty="0"/>
@@ -4834,7 +4779,7 @@
           <a:p>
             <a:fld id="{F3176663-7589-4AB8-B988-53967ED54644}" type="datetimeFigureOut">
               <a:rPr lang="zh-TW" altLang="en-US" smtClean="0"/>
-              <a:t>2021/4/19</a:t>
+              <a:t>2021/4/21</a:t>
             </a:fld>
             <a:endParaRPr lang="zh-TW" altLang="en-US"/>
           </a:p>
@@ -4892,13 +4837,6 @@
   <p:clrMapOvr>
     <a:masterClrMapping/>
   </p:clrMapOvr>
-  <p:timing>
-    <p:tnLst>
-      <p:par>
-        <p:cTn id="1" dur="indefinite" restart="never" nodeType="tmRoot"/>
-      </p:par>
-    </p:tnLst>
-  </p:timing>
 </p:sldLayout>
 </file>
 
@@ -4966,7 +4904,7 @@
           <a:p>
             <a:fld id="{F3176663-7589-4AB8-B988-53967ED54644}" type="datetimeFigureOut">
               <a:rPr lang="zh-TW" altLang="en-US" smtClean="0"/>
-              <a:t>2021/4/19</a:t>
+              <a:t>2021/4/21</a:t>
             </a:fld>
             <a:endParaRPr lang="zh-TW" altLang="en-US"/>
           </a:p>
@@ -5024,13 +4962,6 @@
   <p:clrMapOvr>
     <a:masterClrMapping/>
   </p:clrMapOvr>
-  <p:timing>
-    <p:tnLst>
-      <p:par>
-        <p:cTn id="1" dur="indefinite" restart="never" nodeType="tmRoot"/>
-      </p:par>
-    </p:tnLst>
-  </p:timing>
 </p:sldLayout>
 </file>
 
@@ -5106,7 +5037,7 @@
           </a:lstStyle>
           <a:p>
             <a:r>
-              <a:rPr lang="zh-TW" altLang="en-US" smtClean="0"/>
+              <a:rPr lang="zh-TW" altLang="en-US"/>
               <a:t>按一下以編輯母片標題樣式</a:t>
             </a:r>
             <a:endParaRPr lang="en-US" dirty="0"/>
@@ -5135,35 +5066,35 @@
           <a:p>
             <a:pPr lvl="0"/>
             <a:r>
-              <a:rPr lang="zh-TW" altLang="en-US" smtClean="0"/>
+              <a:rPr lang="zh-TW" altLang="en-US"/>
               <a:t>編輯母片文字樣式</a:t>
             </a:r>
           </a:p>
           <a:p>
             <a:pPr lvl="1"/>
             <a:r>
-              <a:rPr lang="zh-TW" altLang="en-US" smtClean="0"/>
+              <a:rPr lang="zh-TW" altLang="en-US"/>
               <a:t>第二層</a:t>
             </a:r>
           </a:p>
           <a:p>
             <a:pPr lvl="2"/>
             <a:r>
-              <a:rPr lang="zh-TW" altLang="en-US" smtClean="0"/>
+              <a:rPr lang="zh-TW" altLang="en-US"/>
               <a:t>第三層</a:t>
             </a:r>
           </a:p>
           <a:p>
             <a:pPr lvl="3"/>
             <a:r>
-              <a:rPr lang="zh-TW" altLang="en-US" smtClean="0"/>
+              <a:rPr lang="zh-TW" altLang="en-US"/>
               <a:t>第四層</a:t>
             </a:r>
           </a:p>
           <a:p>
             <a:pPr lvl="4"/>
             <a:r>
-              <a:rPr lang="zh-TW" altLang="en-US" smtClean="0"/>
+              <a:rPr lang="zh-TW" altLang="en-US"/>
               <a:t>第五層</a:t>
             </a:r>
             <a:endParaRPr lang="en-US" dirty="0"/>
@@ -5229,7 +5160,7 @@
           <a:p>
             <a:pPr lvl="0"/>
             <a:r>
-              <a:rPr lang="zh-TW" altLang="en-US" smtClean="0"/>
+              <a:rPr lang="zh-TW" altLang="en-US"/>
               <a:t>編輯母片文字樣式</a:t>
             </a:r>
           </a:p>
@@ -5252,7 +5183,7 @@
           <a:p>
             <a:fld id="{F3176663-7589-4AB8-B988-53967ED54644}" type="datetimeFigureOut">
               <a:rPr lang="zh-TW" altLang="en-US" smtClean="0"/>
-              <a:t>2021/4/19</a:t>
+              <a:t>2021/4/21</a:t>
             </a:fld>
             <a:endParaRPr lang="zh-TW" altLang="en-US"/>
           </a:p>
@@ -5310,13 +5241,6 @@
   <p:clrMapOvr>
     <a:masterClrMapping/>
   </p:clrMapOvr>
-  <p:timing>
-    <p:tnLst>
-      <p:par>
-        <p:cTn id="1" dur="indefinite" restart="never" nodeType="tmRoot"/>
-      </p:par>
-    </p:tnLst>
-  </p:timing>
 </p:sldLayout>
 </file>
 
@@ -5392,7 +5316,7 @@
           </a:lstStyle>
           <a:p>
             <a:r>
-              <a:rPr lang="zh-TW" altLang="en-US" smtClean="0"/>
+              <a:rPr lang="zh-TW" altLang="en-US"/>
               <a:t>按一下以編輯母片標題樣式</a:t>
             </a:r>
             <a:endParaRPr lang="en-US" dirty="0"/>
@@ -5482,7 +5406,7 @@
           </a:lstStyle>
           <a:p>
             <a:r>
-              <a:rPr lang="zh-TW" altLang="en-US" smtClean="0"/>
+              <a:rPr lang="zh-TW" altLang="en-US"/>
               <a:t>按一下圖示以新增圖片</a:t>
             </a:r>
             <a:endParaRPr lang="en-US" dirty="0"/>
@@ -5548,7 +5472,7 @@
           <a:p>
             <a:pPr lvl="0"/>
             <a:r>
-              <a:rPr lang="zh-TW" altLang="en-US" smtClean="0"/>
+              <a:rPr lang="zh-TW" altLang="en-US"/>
               <a:t>編輯母片文字樣式</a:t>
             </a:r>
           </a:p>
@@ -5571,7 +5495,7 @@
           <a:p>
             <a:fld id="{F3176663-7589-4AB8-B988-53967ED54644}" type="datetimeFigureOut">
               <a:rPr lang="zh-TW" altLang="en-US" smtClean="0"/>
-              <a:t>2021/4/19</a:t>
+              <a:t>2021/4/21</a:t>
             </a:fld>
             <a:endParaRPr lang="zh-TW" altLang="en-US"/>
           </a:p>
@@ -5629,13 +5553,6 @@
   <p:clrMapOvr>
     <a:masterClrMapping/>
   </p:clrMapOvr>
-  <p:timing>
-    <p:tnLst>
-      <p:par>
-        <p:cTn id="1" dur="indefinite" restart="never" nodeType="tmRoot"/>
-      </p:par>
-    </p:tnLst>
-  </p:timing>
 </p:sldLayout>
 </file>
 
@@ -5738,7 +5655,7 @@
           <a:lstStyle/>
           <a:p>
             <a:r>
-              <a:rPr lang="zh-TW" altLang="en-US" smtClean="0"/>
+              <a:rPr lang="zh-TW" altLang="en-US"/>
               <a:t>按一下以編輯母片標題樣式</a:t>
             </a:r>
             <a:endParaRPr lang="en-US" dirty="0"/>
@@ -5772,35 +5689,35 @@
           <a:p>
             <a:pPr lvl="0"/>
             <a:r>
-              <a:rPr lang="zh-TW" altLang="en-US" smtClean="0"/>
+              <a:rPr lang="zh-TW" altLang="en-US"/>
               <a:t>編輯母片文字樣式</a:t>
             </a:r>
           </a:p>
           <a:p>
             <a:pPr lvl="1"/>
             <a:r>
-              <a:rPr lang="zh-TW" altLang="en-US" smtClean="0"/>
+              <a:rPr lang="zh-TW" altLang="en-US"/>
               <a:t>第二層</a:t>
             </a:r>
           </a:p>
           <a:p>
             <a:pPr lvl="2"/>
             <a:r>
-              <a:rPr lang="zh-TW" altLang="en-US" smtClean="0"/>
+              <a:rPr lang="zh-TW" altLang="en-US"/>
               <a:t>第三層</a:t>
             </a:r>
           </a:p>
           <a:p>
             <a:pPr lvl="3"/>
             <a:r>
-              <a:rPr lang="zh-TW" altLang="en-US" smtClean="0"/>
+              <a:rPr lang="zh-TW" altLang="en-US"/>
               <a:t>第四層</a:t>
             </a:r>
           </a:p>
           <a:p>
             <a:pPr lvl="4"/>
             <a:r>
-              <a:rPr lang="zh-TW" altLang="en-US" smtClean="0"/>
+              <a:rPr lang="zh-TW" altLang="en-US"/>
               <a:t>第五層</a:t>
             </a:r>
             <a:endParaRPr lang="en-US" dirty="0"/>
@@ -5840,7 +5757,7 @@
           <a:p>
             <a:fld id="{F3176663-7589-4AB8-B988-53967ED54644}" type="datetimeFigureOut">
               <a:rPr lang="zh-TW" altLang="en-US" smtClean="0"/>
-              <a:t>2021/4/19</a:t>
+              <a:t>2021/4/21</a:t>
             </a:fld>
             <a:endParaRPr lang="zh-TW" altLang="en-US"/>
           </a:p>
@@ -5947,13 +5864,6 @@
     <p:sldLayoutId id="2147483694" r:id="rId16"/>
     <p:sldLayoutId id="2147483695" r:id="rId17"/>
   </p:sldLayoutIdLst>
-  <p:timing>
-    <p:tnLst>
-      <p:par>
-        <p:cTn id="1" dur="indefinite" restart="never" nodeType="tmRoot"/>
-      </p:par>
-    </p:tnLst>
-  </p:timing>
   <p:txStyles>
     <p:titleStyle>
       <a:lvl1pPr algn="ctr" defTabSz="914400" rtl="0" eaLnBrk="1" latinLnBrk="0" hangingPunct="1">
@@ -6431,7 +6341,7 @@
             </a:r>
           </a:p>
           <a:p>
-            <a:endParaRPr lang="en-US" altLang="zh-TW" dirty="0" smtClean="0"/>
+            <a:endParaRPr lang="en-US" altLang="zh-TW" dirty="0"/>
           </a:p>
           <a:p>
             <a:endParaRPr lang="en-US" altLang="zh-TW" dirty="0"/>
@@ -6531,13 +6441,6 @@
   <p:clrMapOvr>
     <a:masterClrMapping/>
   </p:clrMapOvr>
-  <p:timing>
-    <p:tnLst>
-      <p:par>
-        <p:cTn id="1" dur="indefinite" restart="never" nodeType="tmRoot"/>
-      </p:par>
-    </p:tnLst>
-  </p:timing>
 </p:sld>
 </file>
 
@@ -6568,29 +6471,26 @@
             <p:ph type="title"/>
           </p:nvPr>
         </p:nvSpPr>
-        <p:spPr>
-          <a:xfrm>
-            <a:off x="1061557" y="618517"/>
-            <a:ext cx="1090516" cy="5261438"/>
-          </a:xfrm>
-        </p:spPr>
-        <p:txBody>
-          <a:bodyPr vert="eaVert"/>
+        <p:spPr/>
+        <p:txBody>
+          <a:bodyPr>
+            <a:normAutofit/>
+          </a:bodyPr>
           <a:lstStyle/>
           <a:p>
             <a:pPr algn="l"/>
             <a:r>
-              <a:rPr lang="en-US" altLang="zh-TW" b="1" cap="none" dirty="0" smtClean="0">
+              <a:rPr lang="en-US" altLang="zh-TW" b="1" cap="none" dirty="0">
                 <a:solidFill>
                   <a:srgbClr val="65463E"/>
                 </a:solidFill>
                 <a:latin typeface="微軟正黑體" panose="020B0604030504040204" pitchFamily="34" charset="-120"/>
                 <a:ea typeface="微軟正黑體" panose="020B0604030504040204" pitchFamily="34" charset="-120"/>
               </a:rPr>
-              <a:t>Main</a:t>
-            </a:r>
-            <a:r>
-              <a:rPr lang="en-US" altLang="zh-TW" b="1" dirty="0" smtClean="0">
+              <a:t>Function</a:t>
+            </a:r>
+            <a:r>
+              <a:rPr lang="en-US" altLang="zh-TW" b="1" dirty="0">
                 <a:solidFill>
                   <a:srgbClr val="65463E"/>
                 </a:solidFill>
@@ -6620,7 +6520,7 @@
               <a:t> </a:t>
             </a:r>
             <a:r>
-              <a:rPr lang="en-US" altLang="zh-TW" b="1" cap="none" dirty="0" smtClean="0">
+              <a:rPr lang="en-US" altLang="zh-TW" b="1" cap="none" dirty="0">
                 <a:solidFill>
                   <a:srgbClr val="65463E"/>
                 </a:solidFill>
@@ -6630,41 +6530,28 @@
               <a:t>Part</a:t>
             </a:r>
             <a:r>
-              <a:rPr lang="en-US" altLang="zh-TW" b="1" dirty="0" smtClean="0">
+              <a:rPr lang="en-US" altLang="zh-TW" b="1" dirty="0">
                 <a:solidFill>
                   <a:srgbClr val="65463E"/>
                 </a:solidFill>
                 <a:latin typeface="微軟正黑體" panose="020B0604030504040204" pitchFamily="34" charset="-120"/>
                 <a:ea typeface="微軟正黑體" panose="020B0604030504040204" pitchFamily="34" charset="-120"/>
               </a:rPr>
-              <a:t>1</a:t>
-            </a:r>
-            <a:endParaRPr lang="zh-TW" altLang="en-US" dirty="0"/>
-          </a:p>
-        </p:txBody>
-      </p:sp>
-      <p:sp>
-        <p:nvSpPr>
-          <p:cNvPr id="3" name="內容版面配置區 2"/>
-          <p:cNvSpPr>
-            <a:spLocks noGrp="1"/>
-          </p:cNvSpPr>
-          <p:nvPr>
-            <p:ph sz="quarter" idx="13"/>
-          </p:nvPr>
-        </p:nvSpPr>
-        <p:spPr/>
-        <p:txBody>
-          <a:bodyPr/>
-          <a:lstStyle/>
-          <a:p>
-            <a:endParaRPr lang="zh-TW" altLang="en-US" dirty="0"/>
+              <a:t>3</a:t>
+            </a:r>
+            <a:endParaRPr lang="zh-TW" altLang="en-US" b="1" dirty="0">
+              <a:solidFill>
+                <a:srgbClr val="65463E"/>
+              </a:solidFill>
+              <a:latin typeface="微軟正黑體" panose="020B0604030504040204" pitchFamily="34" charset="-120"/>
+              <a:ea typeface="微軟正黑體" panose="020B0604030504040204" pitchFamily="34" charset="-120"/>
+            </a:endParaRPr>
           </a:p>
         </p:txBody>
       </p:sp>
       <p:pic>
         <p:nvPicPr>
-          <p:cNvPr id="5" name="圖片 4"/>
+          <p:cNvPr id="6" name="圖片 5"/>
           <p:cNvPicPr>
             <a:picLocks noChangeAspect="1"/>
           </p:cNvPicPr>
@@ -6678,8 +6565,8 @@
         </p:blipFill>
         <p:spPr>
           <a:xfrm>
-            <a:off x="2710008" y="618517"/>
-            <a:ext cx="7067550" cy="5400675"/>
+            <a:off x="1211494" y="1828800"/>
+            <a:ext cx="6926254" cy="4793673"/>
           </a:xfrm>
           <a:prstGeom prst="rect">
             <a:avLst/>
@@ -6699,20 +6586,13 @@
     </p:spTree>
     <p:extLst>
       <p:ext uri="{BB962C8B-B14F-4D97-AF65-F5344CB8AC3E}">
-        <p14:creationId xmlns:p14="http://schemas.microsoft.com/office/powerpoint/2010/main" val="422756101"/>
+        <p14:creationId xmlns:p14="http://schemas.microsoft.com/office/powerpoint/2010/main" val="955177461"/>
       </p:ext>
     </p:extLst>
   </p:cSld>
   <p:clrMapOvr>
     <a:masterClrMapping/>
   </p:clrMapOvr>
-  <p:timing>
-    <p:tnLst>
-      <p:par>
-        <p:cTn id="1" dur="indefinite" restart="never" nodeType="tmRoot"/>
-      </p:par>
-    </p:tnLst>
-  </p:timing>
 </p:sld>
 </file>
 
@@ -6755,7 +6635,7 @@
           <a:p>
             <a:pPr algn="l"/>
             <a:r>
-              <a:rPr lang="en-US" altLang="zh-TW" b="1" cap="none" dirty="0" smtClean="0">
+              <a:rPr lang="en-US" altLang="zh-TW" b="1" cap="none" dirty="0">
                 <a:solidFill>
                   <a:srgbClr val="65463E"/>
                 </a:solidFill>
@@ -6765,7 +6645,7 @@
               <a:t>Main</a:t>
             </a:r>
             <a:r>
-              <a:rPr lang="en-US" altLang="zh-TW" b="1" dirty="0" smtClean="0">
+              <a:rPr lang="en-US" altLang="zh-TW" b="1" dirty="0">
                 <a:solidFill>
                   <a:srgbClr val="65463E"/>
                 </a:solidFill>
@@ -6795,7 +6675,7 @@
               <a:t> </a:t>
             </a:r>
             <a:r>
-              <a:rPr lang="en-US" altLang="zh-TW" b="1" cap="none" dirty="0" smtClean="0">
+              <a:rPr lang="en-US" altLang="zh-TW" b="1" cap="none" dirty="0">
                 <a:solidFill>
                   <a:srgbClr val="65463E"/>
                 </a:solidFill>
@@ -6805,41 +6685,22 @@
               <a:t>Part</a:t>
             </a:r>
             <a:r>
-              <a:rPr lang="en-US" altLang="zh-TW" b="1" dirty="0" smtClean="0">
+              <a:rPr lang="en-US" altLang="zh-TW" b="1" dirty="0">
                 <a:solidFill>
                   <a:srgbClr val="65463E"/>
                 </a:solidFill>
                 <a:latin typeface="微軟正黑體" panose="020B0604030504040204" pitchFamily="34" charset="-120"/>
                 <a:ea typeface="微軟正黑體" panose="020B0604030504040204" pitchFamily="34" charset="-120"/>
               </a:rPr>
-              <a:t>2</a:t>
-            </a:r>
-            <a:endParaRPr lang="zh-TW" altLang="en-US" dirty="0"/>
-          </a:p>
-        </p:txBody>
-      </p:sp>
-      <p:sp>
-        <p:nvSpPr>
-          <p:cNvPr id="3" name="內容版面配置區 2"/>
-          <p:cNvSpPr>
-            <a:spLocks noGrp="1"/>
-          </p:cNvSpPr>
-          <p:nvPr>
-            <p:ph sz="quarter" idx="13"/>
-          </p:nvPr>
-        </p:nvSpPr>
-        <p:spPr/>
-        <p:txBody>
-          <a:bodyPr/>
-          <a:lstStyle/>
-          <a:p>
+              <a:t>1</a:t>
+            </a:r>
             <a:endParaRPr lang="zh-TW" altLang="en-US" dirty="0"/>
           </a:p>
         </p:txBody>
       </p:sp>
       <p:pic>
         <p:nvPicPr>
-          <p:cNvPr id="4" name="圖片 3"/>
+          <p:cNvPr id="5" name="圖片 4"/>
           <p:cNvPicPr>
             <a:picLocks noChangeAspect="1"/>
           </p:cNvPicPr>
@@ -6853,8 +6714,8 @@
         </p:blipFill>
         <p:spPr>
           <a:xfrm>
-            <a:off x="2504762" y="1238683"/>
-            <a:ext cx="7181850" cy="3438525"/>
+            <a:off x="2710008" y="618517"/>
+            <a:ext cx="7067550" cy="5400675"/>
           </a:xfrm>
           <a:prstGeom prst="rect">
             <a:avLst/>
@@ -6874,20 +6735,13 @@
     </p:spTree>
     <p:extLst>
       <p:ext uri="{BB962C8B-B14F-4D97-AF65-F5344CB8AC3E}">
-        <p14:creationId xmlns:p14="http://schemas.microsoft.com/office/powerpoint/2010/main" val="1929503663"/>
+        <p14:creationId xmlns:p14="http://schemas.microsoft.com/office/powerpoint/2010/main" val="422756101"/>
       </p:ext>
     </p:extLst>
   </p:cSld>
   <p:clrMapOvr>
     <a:masterClrMapping/>
   </p:clrMapOvr>
-  <p:timing>
-    <p:tnLst>
-      <p:par>
-        <p:cTn id="1" dur="indefinite" restart="never" nodeType="tmRoot"/>
-      </p:par>
-    </p:tnLst>
-  </p:timing>
 </p:sld>
 </file>
 
@@ -6918,11 +6772,37 @@
             <p:ph type="title"/>
           </p:nvPr>
         </p:nvSpPr>
-        <p:spPr/>
-        <p:txBody>
-          <a:bodyPr/>
+        <p:spPr>
+          <a:xfrm>
+            <a:off x="1061557" y="618517"/>
+            <a:ext cx="1090516" cy="5261438"/>
+          </a:xfrm>
+        </p:spPr>
+        <p:txBody>
+          <a:bodyPr vert="eaVert"/>
           <a:lstStyle/>
           <a:p>
+            <a:pPr algn="l"/>
+            <a:r>
+              <a:rPr lang="en-US" altLang="zh-TW" b="1" cap="none" dirty="0">
+                <a:solidFill>
+                  <a:srgbClr val="65463E"/>
+                </a:solidFill>
+                <a:latin typeface="微軟正黑體" panose="020B0604030504040204" pitchFamily="34" charset="-120"/>
+                <a:ea typeface="微軟正黑體" panose="020B0604030504040204" pitchFamily="34" charset="-120"/>
+              </a:rPr>
+              <a:t>Main</a:t>
+            </a:r>
+            <a:r>
+              <a:rPr lang="en-US" altLang="zh-TW" b="1" dirty="0">
+                <a:solidFill>
+                  <a:srgbClr val="65463E"/>
+                </a:solidFill>
+                <a:latin typeface="微軟正黑體" panose="020B0604030504040204" pitchFamily="34" charset="-120"/>
+                <a:ea typeface="微軟正黑體" panose="020B0604030504040204" pitchFamily="34" charset="-120"/>
+              </a:rPr>
+              <a:t> </a:t>
+            </a:r>
             <a:r>
               <a:rPr lang="zh-TW" altLang="en-US" b="1" dirty="0">
                 <a:solidFill>
@@ -6931,153 +6811,71 @@
                 <a:latin typeface="微軟正黑體" panose="020B0604030504040204" pitchFamily="34" charset="-120"/>
                 <a:ea typeface="微軟正黑體" panose="020B0604030504040204" pitchFamily="34" charset="-120"/>
               </a:rPr>
+              <a:t>程式碼</a:t>
+            </a:r>
+            <a:r>
+              <a:rPr lang="en-US" altLang="zh-TW" b="1" dirty="0">
+                <a:solidFill>
+                  <a:srgbClr val="65463E"/>
+                </a:solidFill>
+                <a:latin typeface="微軟正黑體" panose="020B0604030504040204" pitchFamily="34" charset="-120"/>
+                <a:ea typeface="微軟正黑體" panose="020B0604030504040204" pitchFamily="34" charset="-120"/>
+              </a:rPr>
               <a:t> </a:t>
             </a:r>
             <a:r>
-              <a:rPr lang="zh-TW" altLang="en-US" b="1" dirty="0">
-                <a:solidFill>
-                  <a:srgbClr val="2B4D89"/>
-                </a:solidFill>
-                <a:latin typeface="微軟正黑體" panose="020B0604030504040204" pitchFamily="34" charset="-120"/>
-                <a:ea typeface="微軟正黑體" panose="020B0604030504040204" pitchFamily="34" charset="-120"/>
-              </a:rPr>
-              <a:t>辨識結果</a:t>
+              <a:rPr lang="en-US" altLang="zh-TW" b="1" cap="none" dirty="0">
+                <a:solidFill>
+                  <a:srgbClr val="65463E"/>
+                </a:solidFill>
+                <a:latin typeface="微軟正黑體" panose="020B0604030504040204" pitchFamily="34" charset="-120"/>
+                <a:ea typeface="微軟正黑體" panose="020B0604030504040204" pitchFamily="34" charset="-120"/>
+              </a:rPr>
+              <a:t>Part</a:t>
             </a:r>
             <a:r>
               <a:rPr lang="en-US" altLang="zh-TW" b="1" dirty="0">
                 <a:solidFill>
-                  <a:srgbClr val="2B4D89"/>
-                </a:solidFill>
-                <a:latin typeface="微軟正黑體" panose="020B0604030504040204" pitchFamily="34" charset="-120"/>
-                <a:ea typeface="微軟正黑體" panose="020B0604030504040204" pitchFamily="34" charset="-120"/>
-              </a:rPr>
-              <a:t>-</a:t>
-            </a:r>
-            <a:r>
-              <a:rPr lang="zh-TW" altLang="en-US" b="1" dirty="0">
-                <a:solidFill>
-                  <a:srgbClr val="2B4D89"/>
-                </a:solidFill>
-                <a:latin typeface="微軟正黑體" panose="020B0604030504040204" pitchFamily="34" charset="-120"/>
-                <a:ea typeface="微軟正黑體" panose="020B0604030504040204" pitchFamily="34" charset="-120"/>
-              </a:rPr>
-              <a:t>貓與狗</a:t>
-            </a:r>
-            <a:endParaRPr lang="zh-TW" altLang="en-US" dirty="0"/>
-          </a:p>
-        </p:txBody>
-      </p:sp>
-      <p:sp>
-        <p:nvSpPr>
-          <p:cNvPr id="3" name="內容版面配置區 2"/>
-          <p:cNvSpPr>
-            <a:spLocks noGrp="1"/>
-          </p:cNvSpPr>
-          <p:nvPr>
-            <p:ph sz="quarter" idx="13"/>
-          </p:nvPr>
-        </p:nvSpPr>
-        <p:spPr/>
-        <p:txBody>
-          <a:bodyPr/>
-          <a:lstStyle/>
-          <a:p>
-            <a:r>
-              <a:rPr lang="zh-TW" altLang="en-US" sz="1800" b="1" dirty="0">
-                <a:latin typeface="微軟正黑體" panose="020B0604030504040204" pitchFamily="34" charset="-120"/>
-                <a:ea typeface="微軟正黑體" panose="020B0604030504040204" pitchFamily="34" charset="-120"/>
-              </a:rPr>
-              <a:t>由於貓跟小狗的身材較為相像且亮度變化在這裡或許會容易誤導 </a:t>
-            </a:r>
-            <a:r>
-              <a:rPr lang="en-US" altLang="zh-TW" sz="1800" b="1" dirty="0">
-                <a:latin typeface="微軟正黑體" panose="020B0604030504040204" pitchFamily="34" charset="-120"/>
-                <a:ea typeface="微軟正黑體" panose="020B0604030504040204" pitchFamily="34" charset="-120"/>
-              </a:rPr>
-              <a:t>SVM </a:t>
-            </a:r>
-            <a:r>
-              <a:rPr lang="zh-TW" altLang="en-US" sz="1800" b="1" dirty="0">
-                <a:latin typeface="微軟正黑體" panose="020B0604030504040204" pitchFamily="34" charset="-120"/>
-                <a:ea typeface="微軟正黑體" panose="020B0604030504040204" pitchFamily="34" charset="-120"/>
-              </a:rPr>
-              <a:t>進行分別，導致相同的光亮度的貓與狗不好進行分配，才會使其在訓練集的準確率就不高，在此情況下，相對測試集就不高。</a:t>
-            </a:r>
-          </a:p>
-          <a:p>
-            <a:r>
-              <a:rPr lang="zh-TW" altLang="en-US" sz="1800" b="1" dirty="0">
-                <a:latin typeface="微軟正黑體" panose="020B0604030504040204" pitchFamily="34" charset="-120"/>
-                <a:ea typeface="微軟正黑體" panose="020B0604030504040204" pitchFamily="34" charset="-120"/>
-              </a:rPr>
-              <a:t>可能需要白底 </a:t>
-            </a:r>
-            <a:r>
-              <a:rPr lang="en-US" altLang="zh-TW" sz="1800" b="1" dirty="0" err="1">
-                <a:latin typeface="微軟正黑體" panose="020B0604030504040204" pitchFamily="34" charset="-120"/>
-                <a:ea typeface="微軟正黑體" panose="020B0604030504040204" pitchFamily="34" charset="-120"/>
-              </a:rPr>
-              <a:t>png</a:t>
-            </a:r>
-            <a:r>
-              <a:rPr lang="en-US" altLang="zh-TW" sz="1800" b="1" dirty="0">
-                <a:latin typeface="微軟正黑體" panose="020B0604030504040204" pitchFamily="34" charset="-120"/>
-                <a:ea typeface="微軟正黑體" panose="020B0604030504040204" pitchFamily="34" charset="-120"/>
-              </a:rPr>
-              <a:t> </a:t>
-            </a:r>
-            <a:r>
-              <a:rPr lang="zh-TW" altLang="en-US" sz="1800" b="1" dirty="0">
-                <a:latin typeface="微軟正黑體" panose="020B0604030504040204" pitchFamily="34" charset="-120"/>
-                <a:ea typeface="微軟正黑體" panose="020B0604030504040204" pitchFamily="34" charset="-120"/>
-              </a:rPr>
-              <a:t>的大量貓狗照片，就能使得此機器學習辨識率更高。</a:t>
-            </a:r>
-          </a:p>
-          <a:p>
+                  <a:srgbClr val="65463E"/>
+                </a:solidFill>
+                <a:latin typeface="微軟正黑體" panose="020B0604030504040204" pitchFamily="34" charset="-120"/>
+                <a:ea typeface="微軟正黑體" panose="020B0604030504040204" pitchFamily="34" charset="-120"/>
+              </a:rPr>
+              <a:t>2</a:t>
+            </a:r>
             <a:endParaRPr lang="zh-TW" altLang="en-US" dirty="0"/>
           </a:p>
         </p:txBody>
       </p:sp>
       <p:pic>
         <p:nvPicPr>
-          <p:cNvPr id="4" name="內容版面配置區 6"/>
+          <p:cNvPr id="4" name="圖片 3"/>
           <p:cNvPicPr>
             <a:picLocks noChangeAspect="1"/>
           </p:cNvPicPr>
           <p:nvPr/>
         </p:nvPicPr>
         <p:blipFill>
-          <a:blip r:embed="rId2">
-            <a:extLst>
-              <a:ext uri="{28A0092B-C50C-407E-A947-70E740481C1C}">
-                <a14:useLocalDpi xmlns:a14="http://schemas.microsoft.com/office/drawing/2010/main" val="0"/>
-              </a:ext>
-            </a:extLst>
-          </a:blip>
+          <a:blip r:embed="rId2"/>
           <a:stretch>
             <a:fillRect/>
           </a:stretch>
         </p:blipFill>
         <p:spPr>
           <a:xfrm>
-            <a:off x="1294532" y="3706663"/>
-            <a:ext cx="6561779" cy="1391657"/>
+            <a:off x="2504762" y="1238683"/>
+            <a:ext cx="7181850" cy="3438525"/>
           </a:xfrm>
           <a:prstGeom prst="rect">
             <a:avLst/>
           </a:prstGeom>
-          <a:ln w="38100" cap="sq">
-            <a:solidFill>
-              <a:srgbClr val="000000"/>
-            </a:solidFill>
-            <a:prstDash val="solid"/>
-            <a:miter lim="800000"/>
+          <a:ln>
+            <a:noFill/>
           </a:ln>
           <a:effectLst>
-            <a:outerShdw blurRad="50800" dist="38100" dir="2700000" algn="tl" rotWithShape="0">
-              <a:srgbClr val="000000">
-                <a:alpha val="43000"/>
+            <a:outerShdw blurRad="292100" dist="139700" dir="2700000" algn="tl" rotWithShape="0">
+              <a:srgbClr val="333333">
+                <a:alpha val="65000"/>
               </a:srgbClr>
             </a:outerShdw>
           </a:effectLst>
@@ -7086,20 +6884,13 @@
     </p:spTree>
     <p:extLst>
       <p:ext uri="{BB962C8B-B14F-4D97-AF65-F5344CB8AC3E}">
-        <p14:creationId xmlns:p14="http://schemas.microsoft.com/office/powerpoint/2010/main" val="1039673396"/>
+        <p14:creationId xmlns:p14="http://schemas.microsoft.com/office/powerpoint/2010/main" val="1929503663"/>
       </p:ext>
     </p:extLst>
   </p:cSld>
   <p:clrMapOvr>
     <a:masterClrMapping/>
   </p:clrMapOvr>
-  <p:timing>
-    <p:tnLst>
-      <p:par>
-        <p:cTn id="1" dur="indefinite" restart="never" nodeType="tmRoot"/>
-      </p:par>
-    </p:tnLst>
-  </p:timing>
 </p:sld>
 </file>
 
@@ -7153,7 +6944,7 @@
                 <a:latin typeface="微軟正黑體" panose="020B0604030504040204" pitchFamily="34" charset="-120"/>
                 <a:ea typeface="微軟正黑體" panose="020B0604030504040204" pitchFamily="34" charset="-120"/>
               </a:rPr>
-              <a:t>辨識結果</a:t>
+              <a:t>辨識結果與分析</a:t>
             </a:r>
             <a:r>
               <a:rPr lang="en-US" altLang="zh-TW" b="1" dirty="0">
@@ -7173,28 +6964,9 @@
                 <a:latin typeface="微軟正黑體" panose="020B0604030504040204" pitchFamily="34" charset="-120"/>
                 <a:ea typeface="微軟正黑體" panose="020B0604030504040204" pitchFamily="34" charset="-120"/>
               </a:rPr>
-              <a:t>多拉</a:t>
-            </a:r>
-            <a:r>
-              <a:rPr lang="en-US" altLang="zh-TW" b="1" dirty="0">
-                <a:solidFill>
-                  <a:srgbClr val="2B4D89"/>
-                </a:solidFill>
-                <a:latin typeface="微軟正黑體" panose="020B0604030504040204" pitchFamily="34" charset="-120"/>
-                <a:ea typeface="微軟正黑體" panose="020B0604030504040204" pitchFamily="34" charset="-120"/>
-              </a:rPr>
-              <a:t>A</a:t>
-            </a:r>
-            <a:r>
-              <a:rPr lang="zh-TW" altLang="en-US" b="1" dirty="0">
-                <a:solidFill>
-                  <a:srgbClr val="2B4D89"/>
-                </a:solidFill>
-                <a:latin typeface="微軟正黑體" panose="020B0604030504040204" pitchFamily="34" charset="-120"/>
-                <a:ea typeface="微軟正黑體" panose="020B0604030504040204" pitchFamily="34" charset="-120"/>
-              </a:rPr>
-              <a:t>夢與柯南</a:t>
-            </a:r>
+              <a:t>貓與狗</a:t>
+            </a:r>
+            <a:endParaRPr lang="zh-TW" altLang="en-US" dirty="0"/>
           </a:p>
         </p:txBody>
       </p:sp>
@@ -7210,9 +6982,7 @@
         </p:nvSpPr>
         <p:spPr/>
         <p:txBody>
-          <a:bodyPr>
-            <a:normAutofit/>
-          </a:bodyPr>
+          <a:bodyPr/>
           <a:lstStyle/>
           <a:p>
             <a:r>
@@ -7220,94 +6990,55 @@
                 <a:latin typeface="微軟正黑體" panose="020B0604030504040204" pitchFamily="34" charset="-120"/>
                 <a:ea typeface="微軟正黑體" panose="020B0604030504040204" pitchFamily="34" charset="-120"/>
               </a:rPr>
-              <a:t>這組是比較正確的一組，其中我認為哆啦</a:t>
+              <a:t>由於貓跟小狗的身材較為相像，或許會容易誤導 </a:t>
             </a:r>
             <a:r>
               <a:rPr lang="en-US" altLang="zh-TW" sz="1800" b="1" dirty="0">
                 <a:latin typeface="微軟正黑體" panose="020B0604030504040204" pitchFamily="34" charset="-120"/>
                 <a:ea typeface="微軟正黑體" panose="020B0604030504040204" pitchFamily="34" charset="-120"/>
               </a:rPr>
-              <a:t>A</a:t>
+              <a:t>sift </a:t>
             </a:r>
             <a:r>
               <a:rPr lang="zh-TW" altLang="en-US" sz="1800" b="1" dirty="0">
                 <a:latin typeface="微軟正黑體" panose="020B0604030504040204" pitchFamily="34" charset="-120"/>
                 <a:ea typeface="微軟正黑體" panose="020B0604030504040204" pitchFamily="34" charset="-120"/>
               </a:rPr>
-              <a:t>夢與名偵探柯南本身的光影明亮度稍微不同、邊緣也有大不同，因此在交由 </a:t>
+              <a:t>進行分別，才會使其在訓練集的準確率就不高，在此情況下，測試集也不高。</a:t>
+            </a:r>
+          </a:p>
+          <a:p>
+            <a:r>
+              <a:rPr lang="zh-TW" altLang="en-US" sz="1800" b="1" dirty="0">
+                <a:latin typeface="微軟正黑體" panose="020B0604030504040204" pitchFamily="34" charset="-120"/>
+                <a:ea typeface="微軟正黑體" panose="020B0604030504040204" pitchFamily="34" charset="-120"/>
+              </a:rPr>
+              <a:t>可能需要白底 </a:t>
+            </a:r>
+            <a:r>
+              <a:rPr lang="en-US" altLang="zh-TW" sz="1800" b="1" dirty="0" err="1">
+                <a:latin typeface="微軟正黑體" panose="020B0604030504040204" pitchFamily="34" charset="-120"/>
+                <a:ea typeface="微軟正黑體" panose="020B0604030504040204" pitchFamily="34" charset="-120"/>
+              </a:rPr>
+              <a:t>png</a:t>
             </a:r>
             <a:r>
               <a:rPr lang="en-US" altLang="zh-TW" sz="1800" b="1" dirty="0">
                 <a:latin typeface="微軟正黑體" panose="020B0604030504040204" pitchFamily="34" charset="-120"/>
                 <a:ea typeface="微軟正黑體" panose="020B0604030504040204" pitchFamily="34" charset="-120"/>
               </a:rPr>
-              <a:t>SVM </a:t>
+              <a:t> </a:t>
             </a:r>
             <a:r>
               <a:rPr lang="zh-TW" altLang="en-US" sz="1800" b="1" dirty="0">
                 <a:latin typeface="微軟正黑體" panose="020B0604030504040204" pitchFamily="34" charset="-120"/>
                 <a:ea typeface="微軟正黑體" panose="020B0604030504040204" pitchFamily="34" charset="-120"/>
               </a:rPr>
-              <a:t>進行分辨時，較能夠分辨得出差異性。因此在訓練集時準確率可以達到 </a:t>
-            </a:r>
-            <a:r>
-              <a:rPr lang="en-US" altLang="zh-TW" sz="1800" b="1" dirty="0">
-                <a:latin typeface="微軟正黑體" panose="020B0604030504040204" pitchFamily="34" charset="-120"/>
-                <a:ea typeface="微軟正黑體" panose="020B0604030504040204" pitchFamily="34" charset="-120"/>
-              </a:rPr>
-              <a:t>92%</a:t>
-            </a:r>
-            <a:r>
-              <a:rPr lang="zh-TW" altLang="en-US" sz="1800" b="1" dirty="0">
-                <a:latin typeface="微軟正黑體" panose="020B0604030504040204" pitchFamily="34" charset="-120"/>
-                <a:ea typeface="微軟正黑體" panose="020B0604030504040204" pitchFamily="34" charset="-120"/>
-              </a:rPr>
-              <a:t>，在測試集也可以達到 </a:t>
-            </a:r>
-            <a:r>
-              <a:rPr lang="en-US" altLang="zh-TW" sz="1800" b="1" dirty="0">
-                <a:latin typeface="微軟正黑體" panose="020B0604030504040204" pitchFamily="34" charset="-120"/>
-                <a:ea typeface="微軟正黑體" panose="020B0604030504040204" pitchFamily="34" charset="-120"/>
-              </a:rPr>
-              <a:t>72%</a:t>
-            </a:r>
-            <a:r>
-              <a:rPr lang="zh-TW" altLang="en-US" sz="1800" b="1" dirty="0">
-                <a:latin typeface="微軟正黑體" panose="020B0604030504040204" pitchFamily="34" charset="-120"/>
-                <a:ea typeface="微軟正黑體" panose="020B0604030504040204" pitchFamily="34" charset="-120"/>
-              </a:rPr>
-              <a:t>，算是不錯的辨識率。</a:t>
-            </a:r>
-          </a:p>
-          <a:p>
-            <a:r>
-              <a:rPr lang="zh-TW" altLang="en-US" sz="1800" b="1" dirty="0">
-                <a:latin typeface="微軟正黑體" panose="020B0604030504040204" pitchFamily="34" charset="-120"/>
-                <a:ea typeface="微軟正黑體" panose="020B0604030504040204" pitchFamily="34" charset="-120"/>
-              </a:rPr>
-              <a:t>但認為可能還是需要白底的 </a:t>
-            </a:r>
-            <a:r>
-              <a:rPr lang="en-US" altLang="zh-TW" sz="1800" b="1" dirty="0" err="1">
-                <a:latin typeface="微軟正黑體" panose="020B0604030504040204" pitchFamily="34" charset="-120"/>
-                <a:ea typeface="微軟正黑體" panose="020B0604030504040204" pitchFamily="34" charset="-120"/>
-              </a:rPr>
-              <a:t>png</a:t>
-            </a:r>
-            <a:r>
-              <a:rPr lang="en-US" altLang="zh-TW" sz="1800" b="1" dirty="0">
-                <a:latin typeface="微軟正黑體" panose="020B0604030504040204" pitchFamily="34" charset="-120"/>
-                <a:ea typeface="微軟正黑體" panose="020B0604030504040204" pitchFamily="34" charset="-120"/>
-              </a:rPr>
-              <a:t> </a:t>
-            </a:r>
-            <a:r>
-              <a:rPr lang="zh-TW" altLang="en-US" sz="1800" b="1" dirty="0">
-                <a:latin typeface="微軟正黑體" panose="020B0604030504040204" pitchFamily="34" charset="-120"/>
-                <a:ea typeface="微軟正黑體" panose="020B0604030504040204" pitchFamily="34" charset="-120"/>
-              </a:rPr>
-              <a:t>照片，會讓他更為準確，我認為可能有些辨識失敗的原因是圖片有大量不相干的背景使得，那不相干的背景如果與另一類型的背景相似時，就有分辨失誤的可能性。</a:t>
-            </a:r>
+              <a:t>的大量貓狗照片，就能使得此機器學習辨識率更高。</a:t>
+            </a:r>
+          </a:p>
+          <a:p>
+            <a:endParaRPr lang="zh-TW" altLang="en-US" dirty="0"/>
           </a:p>
         </p:txBody>
       </p:sp>
@@ -7327,14 +7058,13 @@
               </a:ext>
             </a:extLst>
           </a:blip>
-          <a:stretch>
-            <a:fillRect/>
-          </a:stretch>
+          <a:srcRect/>
+          <a:stretch/>
         </p:blipFill>
         <p:spPr>
           <a:xfrm>
-            <a:off x="1237382" y="4399542"/>
-            <a:ext cx="6561779" cy="1391657"/>
+            <a:off x="1578906" y="3792927"/>
+            <a:ext cx="4516781" cy="1391657"/>
           </a:xfrm>
           <a:prstGeom prst="rect">
             <a:avLst/>
@@ -7358,6 +7088,270 @@
     </p:spTree>
     <p:extLst>
       <p:ext uri="{BB962C8B-B14F-4D97-AF65-F5344CB8AC3E}">
+        <p14:creationId xmlns:p14="http://schemas.microsoft.com/office/powerpoint/2010/main" val="1039673396"/>
+      </p:ext>
+    </p:extLst>
+  </p:cSld>
+  <p:clrMapOvr>
+    <a:masterClrMapping/>
+  </p:clrMapOvr>
+</p:sld>
+</file>
+
+<file path=ppt/slides/slide14.xml><?xml version="1.0" encoding="utf-8"?>
+<p:sld xmlns:a="http://schemas.openxmlformats.org/drawingml/2006/main" xmlns:r="http://schemas.openxmlformats.org/officeDocument/2006/relationships" xmlns:p="http://schemas.openxmlformats.org/presentationml/2006/main">
+  <p:cSld>
+    <p:spTree>
+      <p:nvGrpSpPr>
+        <p:cNvPr id="1" name=""/>
+        <p:cNvGrpSpPr/>
+        <p:nvPr/>
+      </p:nvGrpSpPr>
+      <p:grpSpPr>
+        <a:xfrm>
+          <a:off x="0" y="0"/>
+          <a:ext cx="0" cy="0"/>
+          <a:chOff x="0" y="0"/>
+          <a:chExt cx="0" cy="0"/>
+        </a:xfrm>
+      </p:grpSpPr>
+      <p:sp>
+        <p:nvSpPr>
+          <p:cNvPr id="2" name="標題 1"/>
+          <p:cNvSpPr>
+            <a:spLocks noGrp="1"/>
+          </p:cNvSpPr>
+          <p:nvPr>
+            <p:ph type="title"/>
+          </p:nvPr>
+        </p:nvSpPr>
+        <p:spPr/>
+        <p:txBody>
+          <a:bodyPr/>
+          <a:lstStyle/>
+          <a:p>
+            <a:r>
+              <a:rPr lang="zh-TW" altLang="en-US" b="1" dirty="0">
+                <a:solidFill>
+                  <a:srgbClr val="65463E"/>
+                </a:solidFill>
+                <a:latin typeface="微軟正黑體" panose="020B0604030504040204" pitchFamily="34" charset="-120"/>
+                <a:ea typeface="微軟正黑體" panose="020B0604030504040204" pitchFamily="34" charset="-120"/>
+              </a:rPr>
+              <a:t> </a:t>
+            </a:r>
+            <a:r>
+              <a:rPr lang="zh-TW" altLang="en-US" b="1" dirty="0">
+                <a:solidFill>
+                  <a:srgbClr val="2B4D89"/>
+                </a:solidFill>
+                <a:latin typeface="微軟正黑體" panose="020B0604030504040204" pitchFamily="34" charset="-120"/>
+                <a:ea typeface="微軟正黑體" panose="020B0604030504040204" pitchFamily="34" charset="-120"/>
+              </a:rPr>
+              <a:t>辨識結果與分析</a:t>
+            </a:r>
+            <a:r>
+              <a:rPr lang="en-US" altLang="zh-TW" b="1" dirty="0">
+                <a:solidFill>
+                  <a:srgbClr val="2B4D89"/>
+                </a:solidFill>
+                <a:latin typeface="微軟正黑體" panose="020B0604030504040204" pitchFamily="34" charset="-120"/>
+                <a:ea typeface="微軟正黑體" panose="020B0604030504040204" pitchFamily="34" charset="-120"/>
+              </a:rPr>
+              <a:t>-</a:t>
+            </a:r>
+            <a:r>
+              <a:rPr lang="zh-TW" altLang="en-US" b="1" dirty="0">
+                <a:solidFill>
+                  <a:srgbClr val="2B4D89"/>
+                </a:solidFill>
+                <a:latin typeface="微軟正黑體" panose="020B0604030504040204" pitchFamily="34" charset="-120"/>
+                <a:ea typeface="微軟正黑體" panose="020B0604030504040204" pitchFamily="34" charset="-120"/>
+              </a:rPr>
+              <a:t>哆啦</a:t>
+            </a:r>
+            <a:r>
+              <a:rPr lang="en-US" altLang="zh-TW" b="1" dirty="0">
+                <a:solidFill>
+                  <a:srgbClr val="2B4D89"/>
+                </a:solidFill>
+                <a:latin typeface="微軟正黑體" panose="020B0604030504040204" pitchFamily="34" charset="-120"/>
+                <a:ea typeface="微軟正黑體" panose="020B0604030504040204" pitchFamily="34" charset="-120"/>
+              </a:rPr>
+              <a:t>A</a:t>
+            </a:r>
+            <a:r>
+              <a:rPr lang="zh-TW" altLang="en-US" b="1" dirty="0">
+                <a:solidFill>
+                  <a:srgbClr val="2B4D89"/>
+                </a:solidFill>
+                <a:latin typeface="微軟正黑體" panose="020B0604030504040204" pitchFamily="34" charset="-120"/>
+                <a:ea typeface="微軟正黑體" panose="020B0604030504040204" pitchFamily="34" charset="-120"/>
+              </a:rPr>
+              <a:t>夢與柯南</a:t>
+            </a:r>
+          </a:p>
+        </p:txBody>
+      </p:sp>
+      <p:sp>
+        <p:nvSpPr>
+          <p:cNvPr id="3" name="內容版面配置區 2"/>
+          <p:cNvSpPr>
+            <a:spLocks noGrp="1"/>
+          </p:cNvSpPr>
+          <p:nvPr>
+            <p:ph sz="quarter" idx="13"/>
+          </p:nvPr>
+        </p:nvSpPr>
+        <p:spPr/>
+        <p:txBody>
+          <a:bodyPr>
+            <a:normAutofit/>
+          </a:bodyPr>
+          <a:lstStyle/>
+          <a:p>
+            <a:r>
+              <a:rPr lang="zh-TW" altLang="en-US" sz="1800" b="1" dirty="0">
+                <a:latin typeface="微軟正黑體" panose="020B0604030504040204" pitchFamily="34" charset="-120"/>
+                <a:ea typeface="微軟正黑體" panose="020B0604030504040204" pitchFamily="34" charset="-120"/>
+              </a:rPr>
+              <a:t>這組是比較正確的一組，其中我認為哆啦</a:t>
+            </a:r>
+            <a:r>
+              <a:rPr lang="en-US" altLang="zh-TW" sz="1800" b="1" dirty="0">
+                <a:latin typeface="微軟正黑體" panose="020B0604030504040204" pitchFamily="34" charset="-120"/>
+                <a:ea typeface="微軟正黑體" panose="020B0604030504040204" pitchFamily="34" charset="-120"/>
+              </a:rPr>
+              <a:t>A</a:t>
+            </a:r>
+            <a:r>
+              <a:rPr lang="zh-TW" altLang="en-US" sz="1800" b="1" dirty="0">
+                <a:latin typeface="微軟正黑體" panose="020B0604030504040204" pitchFamily="34" charset="-120"/>
+                <a:ea typeface="微軟正黑體" panose="020B0604030504040204" pitchFamily="34" charset="-120"/>
+              </a:rPr>
+              <a:t>夢與名偵探柯南本身的邊緣有大不同，因此在交由 </a:t>
+            </a:r>
+            <a:r>
+              <a:rPr lang="en-US" altLang="zh-TW" sz="1800" b="1" dirty="0">
+                <a:latin typeface="微軟正黑體" panose="020B0604030504040204" pitchFamily="34" charset="-120"/>
+                <a:ea typeface="微軟正黑體" panose="020B0604030504040204" pitchFamily="34" charset="-120"/>
+              </a:rPr>
+              <a:t>sift </a:t>
+            </a:r>
+            <a:r>
+              <a:rPr lang="zh-TW" altLang="en-US" sz="1800" b="1" dirty="0">
+                <a:latin typeface="微軟正黑體" panose="020B0604030504040204" pitchFamily="34" charset="-120"/>
+                <a:ea typeface="微軟正黑體" panose="020B0604030504040204" pitchFamily="34" charset="-120"/>
+              </a:rPr>
+              <a:t>進行分辨時，較能夠分辨得出差異性。因此在訓練集時準確率可以達到 </a:t>
+            </a:r>
+            <a:r>
+              <a:rPr lang="en-US" altLang="zh-TW" sz="1800" b="1" dirty="0">
+                <a:latin typeface="微軟正黑體" panose="020B0604030504040204" pitchFamily="34" charset="-120"/>
+                <a:ea typeface="微軟正黑體" panose="020B0604030504040204" pitchFamily="34" charset="-120"/>
+              </a:rPr>
+              <a:t>96%</a:t>
+            </a:r>
+            <a:r>
+              <a:rPr lang="zh-TW" altLang="en-US" sz="1800" b="1" dirty="0">
+                <a:latin typeface="微軟正黑體" panose="020B0604030504040204" pitchFamily="34" charset="-120"/>
+                <a:ea typeface="微軟正黑體" panose="020B0604030504040204" pitchFamily="34" charset="-120"/>
+              </a:rPr>
+              <a:t>，但測試集還是只有</a:t>
+            </a:r>
+            <a:r>
+              <a:rPr lang="en-US" altLang="zh-TW" sz="1800" b="1" dirty="0">
+                <a:latin typeface="微軟正黑體" panose="020B0604030504040204" pitchFamily="34" charset="-120"/>
+                <a:ea typeface="微軟正黑體" panose="020B0604030504040204" pitchFamily="34" charset="-120"/>
+              </a:rPr>
+              <a:t>65%</a:t>
+            </a:r>
+            <a:r>
+              <a:rPr lang="zh-TW" altLang="en-US" sz="1800" b="1" dirty="0">
+                <a:latin typeface="微軟正黑體" panose="020B0604030504040204" pitchFamily="34" charset="-120"/>
+                <a:ea typeface="微軟正黑體" panose="020B0604030504040204" pitchFamily="34" charset="-120"/>
+              </a:rPr>
+              <a:t>，也算不上好的辨識率。</a:t>
+            </a:r>
+          </a:p>
+          <a:p>
+            <a:r>
+              <a:rPr lang="zh-TW" altLang="en-US" sz="1800" b="1" dirty="0">
+                <a:latin typeface="微軟正黑體" panose="020B0604030504040204" pitchFamily="34" charset="-120"/>
+                <a:ea typeface="微軟正黑體" panose="020B0604030504040204" pitchFamily="34" charset="-120"/>
+              </a:rPr>
+              <a:t>可能還是需要白底的 </a:t>
+            </a:r>
+            <a:r>
+              <a:rPr lang="en-US" altLang="zh-TW" sz="1800" b="1" dirty="0" err="1">
+                <a:latin typeface="微軟正黑體" panose="020B0604030504040204" pitchFamily="34" charset="-120"/>
+                <a:ea typeface="微軟正黑體" panose="020B0604030504040204" pitchFamily="34" charset="-120"/>
+              </a:rPr>
+              <a:t>png</a:t>
+            </a:r>
+            <a:r>
+              <a:rPr lang="en-US" altLang="zh-TW" sz="1800" b="1" dirty="0">
+                <a:latin typeface="微軟正黑體" panose="020B0604030504040204" pitchFamily="34" charset="-120"/>
+                <a:ea typeface="微軟正黑體" panose="020B0604030504040204" pitchFamily="34" charset="-120"/>
+              </a:rPr>
+              <a:t> </a:t>
+            </a:r>
+            <a:r>
+              <a:rPr lang="zh-TW" altLang="en-US" sz="1800" b="1" dirty="0">
+                <a:latin typeface="微軟正黑體" panose="020B0604030504040204" pitchFamily="34" charset="-120"/>
+                <a:ea typeface="微軟正黑體" panose="020B0604030504040204" pitchFamily="34" charset="-120"/>
+              </a:rPr>
+              <a:t>照片，會讓他更為準確，我認為可能有些辨識失敗的原因是圖片有大量不相干的背景使得，那不相干的背景如果與另一類型的背景相似時，就有分辨失誤的可能性。</a:t>
+            </a:r>
+          </a:p>
+        </p:txBody>
+      </p:sp>
+      <p:pic>
+        <p:nvPicPr>
+          <p:cNvPr id="4" name="內容版面配置區 6"/>
+          <p:cNvPicPr>
+            <a:picLocks noChangeAspect="1"/>
+          </p:cNvPicPr>
+          <p:nvPr/>
+        </p:nvPicPr>
+        <p:blipFill>
+          <a:blip r:embed="rId2">
+            <a:extLst>
+              <a:ext uri="{28A0092B-C50C-407E-A947-70E740481C1C}">
+                <a14:useLocalDpi xmlns:a14="http://schemas.microsoft.com/office/drawing/2010/main" val="0"/>
+              </a:ext>
+            </a:extLst>
+          </a:blip>
+          <a:srcRect/>
+          <a:stretch/>
+        </p:blipFill>
+        <p:spPr>
+          <a:xfrm>
+            <a:off x="1905863" y="4399542"/>
+            <a:ext cx="5224817" cy="1391657"/>
+          </a:xfrm>
+          <a:prstGeom prst="rect">
+            <a:avLst/>
+          </a:prstGeom>
+          <a:ln w="38100" cap="sq">
+            <a:solidFill>
+              <a:srgbClr val="000000"/>
+            </a:solidFill>
+            <a:prstDash val="solid"/>
+            <a:miter lim="800000"/>
+          </a:ln>
+          <a:effectLst>
+            <a:outerShdw blurRad="50800" dist="38100" dir="2700000" algn="tl" rotWithShape="0">
+              <a:srgbClr val="000000">
+                <a:alpha val="43000"/>
+              </a:srgbClr>
+            </a:outerShdw>
+          </a:effectLst>
+        </p:spPr>
+      </p:pic>
+    </p:spTree>
+    <p:extLst>
+      <p:ext uri="{BB962C8B-B14F-4D97-AF65-F5344CB8AC3E}">
         <p14:creationId xmlns:p14="http://schemas.microsoft.com/office/powerpoint/2010/main" val="3279335882"/>
       </p:ext>
     </p:extLst>
@@ -7365,13 +7359,6 @@
   <p:clrMapOvr>
     <a:masterClrMapping/>
   </p:clrMapOvr>
-  <p:timing>
-    <p:tnLst>
-      <p:par>
-        <p:cTn id="1" dur="indefinite" restart="never" nodeType="tmRoot"/>
-      </p:par>
-    </p:tnLst>
-  </p:timing>
 </p:sld>
 </file>
 
@@ -7512,13 +7499,6 @@
   <p:clrMapOvr>
     <a:masterClrMapping/>
   </p:clrMapOvr>
-  <p:timing>
-    <p:tnLst>
-      <p:par>
-        <p:cTn id="1" dur="indefinite" restart="never" nodeType="tmRoot"/>
-      </p:par>
-    </p:tnLst>
-  </p:timing>
 </p:sld>
 </file>
 
@@ -7589,7 +7569,7 @@
               <a:t>SIFT </a:t>
             </a:r>
             <a:r>
-              <a:rPr lang="zh-TW" altLang="en-US" b="1" dirty="0" smtClean="0">
+              <a:rPr lang="zh-TW" altLang="en-US" b="1" dirty="0">
                 <a:solidFill>
                   <a:srgbClr val="65463E"/>
                 </a:solidFill>
@@ -7636,99 +7616,74 @@
                 <a:latin typeface="微軟正黑體" panose="020B0604030504040204" pitchFamily="34" charset="-120"/>
                 <a:ea typeface="微軟正黑體" panose="020B0604030504040204" pitchFamily="34" charset="-120"/>
               </a:rPr>
-              <a:t>中文名</a:t>
-            </a:r>
-            <a:r>
-              <a:rPr lang="zh-TW" altLang="en-US" sz="1800" b="1" dirty="0" smtClean="0">
-                <a:latin typeface="微軟正黑體" panose="020B0604030504040204" pitchFamily="34" charset="-120"/>
-                <a:ea typeface="微軟正黑體" panose="020B0604030504040204" pitchFamily="34" charset="-120"/>
-              </a:rPr>
-              <a:t>為尺度</a:t>
-            </a:r>
-            <a:r>
-              <a:rPr lang="zh-TW" altLang="en-US" sz="1800" b="1" dirty="0">
-                <a:latin typeface="微軟正黑體" panose="020B0604030504040204" pitchFamily="34" charset="-120"/>
-                <a:ea typeface="微軟正黑體" panose="020B0604030504040204" pitchFamily="34" charset="-120"/>
-              </a:rPr>
-              <a:t>不變特徵</a:t>
-            </a:r>
-            <a:r>
-              <a:rPr lang="zh-TW" altLang="en-US" sz="1800" b="1" dirty="0" smtClean="0">
-                <a:latin typeface="微軟正黑體" panose="020B0604030504040204" pitchFamily="34" charset="-120"/>
-                <a:ea typeface="微軟正黑體" panose="020B0604030504040204" pitchFamily="34" charset="-120"/>
-              </a:rPr>
-              <a:t>轉換</a:t>
-            </a:r>
-            <a:endParaRPr lang="en-US" altLang="zh-TW" sz="1800" b="1" dirty="0" smtClean="0">
+              <a:t>中文名為尺度不變特徵轉換</a:t>
+            </a:r>
+            <a:endParaRPr lang="en-US" altLang="zh-TW" sz="1800" b="1" dirty="0">
               <a:latin typeface="微軟正黑體" panose="020B0604030504040204" pitchFamily="34" charset="-120"/>
               <a:ea typeface="微軟正黑體" panose="020B0604030504040204" pitchFamily="34" charset="-120"/>
             </a:endParaRPr>
           </a:p>
           <a:p>
             <a:r>
-              <a:rPr lang="zh-TW" altLang="en-US" sz="1800" b="1" dirty="0" smtClean="0">
+              <a:rPr lang="zh-TW" altLang="en-US" sz="1800" b="1" dirty="0">
                 <a:solidFill>
                   <a:srgbClr val="FF0000"/>
                 </a:solidFill>
                 <a:latin typeface="微軟正黑體" panose="020B0604030504040204" pitchFamily="34" charset="-120"/>
                 <a:ea typeface="微軟正黑體" panose="020B0604030504040204" pitchFamily="34" charset="-120"/>
               </a:rPr>
-              <a:t>局部</a:t>
+              <a:t>局部特徵、旋轉、尺度縮放、亮度變化，有很好的完整性；對視角變化、仿射變換、噪聲</a:t>
             </a:r>
             <a:r>
               <a:rPr lang="zh-TW" altLang="en-US" sz="1800" b="1" dirty="0">
+                <a:latin typeface="微軟正黑體" panose="020B0604030504040204" pitchFamily="34" charset="-120"/>
+                <a:ea typeface="微軟正黑體" panose="020B0604030504040204" pitchFamily="34" charset="-120"/>
+              </a:rPr>
+              <a:t>，也有一定的穩定度</a:t>
+            </a:r>
+          </a:p>
+          <a:p>
+            <a:r>
+              <a:rPr lang="zh-TW" altLang="en-US" sz="1800" b="1" dirty="0">
                 <a:solidFill>
                   <a:srgbClr val="FF0000"/>
                 </a:solidFill>
                 <a:latin typeface="微軟正黑體" panose="020B0604030504040204" pitchFamily="34" charset="-120"/>
                 <a:ea typeface="微軟正黑體" panose="020B0604030504040204" pitchFamily="34" charset="-120"/>
               </a:rPr>
-              <a:t>特徵、旋轉、尺度縮放、亮度變化，有很好的完整性；對視角變化、仿射變換、噪聲</a:t>
-            </a:r>
+              <a:t>保留圖片獨特性、訊息量大，適合大量特徵，可進行快速、準確的匹配</a:t>
+            </a:r>
+          </a:p>
+          <a:p>
             <a:r>
               <a:rPr lang="zh-TW" altLang="en-US" sz="1800" b="1" dirty="0">
                 <a:latin typeface="微軟正黑體" panose="020B0604030504040204" pitchFamily="34" charset="-120"/>
                 <a:ea typeface="微軟正黑體" panose="020B0604030504040204" pitchFamily="34" charset="-120"/>
               </a:rPr>
-              <a:t>，也有一定的穩定度</a:t>
-            </a:r>
-          </a:p>
-          <a:p>
-            <a:r>
-              <a:rPr lang="zh-TW" altLang="en-US" sz="1800" b="1" dirty="0" smtClean="0">
-                <a:solidFill>
-                  <a:srgbClr val="FF0000"/>
-                </a:solidFill>
-                <a:latin typeface="微軟正黑體" panose="020B0604030504040204" pitchFamily="34" charset="-120"/>
-                <a:ea typeface="微軟正黑體" panose="020B0604030504040204" pitchFamily="34" charset="-120"/>
-              </a:rPr>
-              <a:t>保留</a:t>
+              <a:t>如果只有少數幾張圖片也可以產生大量的 </a:t>
+            </a:r>
+            <a:r>
+              <a:rPr lang="en-US" altLang="zh-TW" sz="1800" b="1" dirty="0">
+                <a:latin typeface="微軟正黑體" panose="020B0604030504040204" pitchFamily="34" charset="-120"/>
+                <a:ea typeface="微軟正黑體" panose="020B0604030504040204" pitchFamily="34" charset="-120"/>
+              </a:rPr>
+              <a:t>SIFT </a:t>
             </a:r>
             <a:r>
               <a:rPr lang="zh-TW" altLang="en-US" sz="1800" b="1" dirty="0">
-                <a:solidFill>
-                  <a:srgbClr val="FF0000"/>
-                </a:solidFill>
-                <a:latin typeface="微軟正黑體" panose="020B0604030504040204" pitchFamily="34" charset="-120"/>
-                <a:ea typeface="微軟正黑體" panose="020B0604030504040204" pitchFamily="34" charset="-120"/>
-              </a:rPr>
-              <a:t>圖片獨特性、訊息量大，適合大量特徵，可進行快速、準確的匹配</a:t>
-            </a:r>
-          </a:p>
-          <a:p>
-            <a:r>
-              <a:rPr lang="zh-TW" altLang="en-US" sz="1800" b="1" dirty="0" smtClean="0">
-                <a:latin typeface="微軟正黑體" panose="020B0604030504040204" pitchFamily="34" charset="-120"/>
-                <a:ea typeface="微軟正黑體" panose="020B0604030504040204" pitchFamily="34" charset="-120"/>
-              </a:rPr>
-              <a:t>如果</a:t>
-            </a:r>
+                <a:latin typeface="微軟正黑體" panose="020B0604030504040204" pitchFamily="34" charset="-120"/>
+                <a:ea typeface="微軟正黑體" panose="020B0604030504040204" pitchFamily="34" charset="-120"/>
+              </a:rPr>
+              <a:t>特徵</a:t>
+            </a:r>
+          </a:p>
+          <a:p>
             <a:r>
               <a:rPr lang="zh-TW" altLang="en-US" sz="1800" b="1" dirty="0">
                 <a:latin typeface="微軟正黑體" panose="020B0604030504040204" pitchFamily="34" charset="-120"/>
                 <a:ea typeface="微軟正黑體" panose="020B0604030504040204" pitchFamily="34" charset="-120"/>
               </a:rPr>
-              <a:t>只有少數幾張圖片也可以產生大量的 </a:t>
+              <a:t>最佳化的 </a:t>
             </a:r>
             <a:r>
               <a:rPr lang="en-US" altLang="zh-TW" sz="1800" b="1" dirty="0">
@@ -7742,67 +7697,16 @@
                 <a:latin typeface="微軟正黑體" panose="020B0604030504040204" pitchFamily="34" charset="-120"/>
                 <a:ea typeface="微軟正黑體" panose="020B0604030504040204" pitchFamily="34" charset="-120"/>
               </a:rPr>
-              <a:t>特徵</a:t>
-            </a:r>
-          </a:p>
-          <a:p>
-            <a:r>
-              <a:rPr lang="zh-TW" altLang="en-US" sz="1800" b="1" dirty="0" smtClean="0">
-                <a:latin typeface="微軟正黑體" panose="020B0604030504040204" pitchFamily="34" charset="-120"/>
-                <a:ea typeface="微軟正黑體" panose="020B0604030504040204" pitchFamily="34" charset="-120"/>
-              </a:rPr>
-              <a:t>最佳化</a:t>
-            </a:r>
+              <a:t>不需要花費時間就能完成</a:t>
+            </a:r>
+          </a:p>
+          <a:p>
             <a:r>
               <a:rPr lang="zh-TW" altLang="en-US" sz="1800" b="1" dirty="0">
                 <a:latin typeface="微軟正黑體" panose="020B0604030504040204" pitchFamily="34" charset="-120"/>
                 <a:ea typeface="微軟正黑體" panose="020B0604030504040204" pitchFamily="34" charset="-120"/>
               </a:rPr>
-              <a:t>的 </a:t>
-            </a:r>
-            <a:r>
-              <a:rPr lang="en-US" altLang="zh-TW" sz="1800" b="1" dirty="0">
-                <a:latin typeface="微軟正黑體" panose="020B0604030504040204" pitchFamily="34" charset="-120"/>
-                <a:ea typeface="微軟正黑體" panose="020B0604030504040204" pitchFamily="34" charset="-120"/>
-              </a:rPr>
-              <a:t>SIFT </a:t>
-            </a:r>
-            <a:r>
-              <a:rPr lang="zh-TW" altLang="en-US" sz="1800" b="1" dirty="0">
-                <a:latin typeface="微軟正黑體" panose="020B0604030504040204" pitchFamily="34" charset="-120"/>
-                <a:ea typeface="微軟正黑體" panose="020B0604030504040204" pitchFamily="34" charset="-120"/>
-              </a:rPr>
-              <a:t>不</a:t>
-            </a:r>
-            <a:r>
-              <a:rPr lang="zh-TW" altLang="en-US" sz="1800" b="1" dirty="0" smtClean="0">
-                <a:latin typeface="微軟正黑體" panose="020B0604030504040204" pitchFamily="34" charset="-120"/>
-                <a:ea typeface="微軟正黑體" panose="020B0604030504040204" pitchFamily="34" charset="-120"/>
-              </a:rPr>
-              <a:t>需要花費時間</a:t>
-            </a:r>
-            <a:r>
-              <a:rPr lang="zh-TW" altLang="en-US" sz="1800" b="1" dirty="0">
-                <a:latin typeface="微軟正黑體" panose="020B0604030504040204" pitchFamily="34" charset="-120"/>
-                <a:ea typeface="微軟正黑體" panose="020B0604030504040204" pitchFamily="34" charset="-120"/>
-              </a:rPr>
-              <a:t>就能完成</a:t>
-            </a:r>
-          </a:p>
-          <a:p>
-            <a:r>
-              <a:rPr lang="zh-TW" altLang="en-US" sz="1800" b="1" dirty="0" smtClean="0">
-                <a:latin typeface="微軟正黑體" panose="020B0604030504040204" pitchFamily="34" charset="-120"/>
-                <a:ea typeface="微軟正黑體" panose="020B0604030504040204" pitchFamily="34" charset="-120"/>
-              </a:rPr>
-              <a:t>方便</a:t>
-            </a:r>
-            <a:r>
-              <a:rPr lang="zh-TW" altLang="en-US" sz="1800" b="1" dirty="0">
-                <a:latin typeface="微軟正黑體" panose="020B0604030504040204" pitchFamily="34" charset="-120"/>
-                <a:ea typeface="微軟正黑體" panose="020B0604030504040204" pitchFamily="34" charset="-120"/>
-              </a:rPr>
-              <a:t>與其他特徵向量結合</a:t>
+              <a:t>方便與其他特徵向量結合</a:t>
             </a:r>
           </a:p>
         </p:txBody>
@@ -7817,13 +7721,6 @@
   <p:clrMapOvr>
     <a:masterClrMapping/>
   </p:clrMapOvr>
-  <p:timing>
-    <p:tnLst>
-      <p:par>
-        <p:cTn id="1" dur="indefinite" restart="never" nodeType="tmRoot"/>
-      </p:par>
-    </p:tnLst>
-  </p:timing>
 </p:sld>
 </file>
 
@@ -7860,24 +7757,34 @@
           <a:lstStyle/>
           <a:p>
             <a:r>
+              <a:rPr lang="zh-TW" altLang="en-US" b="1">
+                <a:solidFill>
+                  <a:srgbClr val="65463E"/>
+                </a:solidFill>
+                <a:latin typeface="微軟正黑體" panose="020B0604030504040204" pitchFamily="34" charset="-120"/>
+                <a:ea typeface="微軟正黑體" panose="020B0604030504040204" pitchFamily="34" charset="-120"/>
+              </a:rPr>
+              <a:t> </a:t>
+            </a:r>
+            <a:r>
+              <a:rPr lang="zh-TW" altLang="en-US" b="1">
+                <a:solidFill>
+                  <a:srgbClr val="2B4D89"/>
+                </a:solidFill>
+                <a:latin typeface="微軟正黑體" panose="020B0604030504040204" pitchFamily="34" charset="-120"/>
+                <a:ea typeface="微軟正黑體" panose="020B0604030504040204" pitchFamily="34" charset="-120"/>
+              </a:rPr>
+              <a:t>遇到的困難</a:t>
+            </a:r>
+            <a:r>
               <a:rPr lang="zh-TW" altLang="en-US" b="1" dirty="0">
                 <a:solidFill>
-                  <a:srgbClr val="65463E"/>
-                </a:solidFill>
-                <a:latin typeface="微軟正黑體" panose="020B0604030504040204" pitchFamily="34" charset="-120"/>
-                <a:ea typeface="微軟正黑體" panose="020B0604030504040204" pitchFamily="34" charset="-120"/>
-              </a:rPr>
-              <a:t> </a:t>
-            </a:r>
-            <a:r>
-              <a:rPr lang="zh-TW" altLang="en-US" b="1" dirty="0">
-                <a:solidFill>
                   <a:srgbClr val="2B4D89"/>
                 </a:solidFill>
                 <a:latin typeface="微軟正黑體" panose="020B0604030504040204" pitchFamily="34" charset="-120"/>
                 <a:ea typeface="微軟正黑體" panose="020B0604030504040204" pitchFamily="34" charset="-120"/>
               </a:rPr>
-              <a:t>資料集的選擇</a:t>
+              <a:t>及解決</a:t>
             </a:r>
           </a:p>
         </p:txBody>
@@ -7900,206 +7807,116 @@
           <a:lstStyle/>
           <a:p>
             <a:r>
-              <a:rPr lang="zh-TW" altLang="en-US" sz="1800" b="1" dirty="0" smtClean="0">
-                <a:latin typeface="微軟正黑體" panose="020B0604030504040204" pitchFamily="34" charset="-120"/>
-                <a:ea typeface="微軟正黑體" panose="020B0604030504040204" pitchFamily="34" charset="-120"/>
-              </a:rPr>
-              <a:t>我們選擇兩組兩類別的資料集，一組是貓與狗，另一組是名偵探柯南與哆啦</a:t>
-            </a:r>
-            <a:r>
-              <a:rPr lang="en-US" altLang="zh-TW" sz="1800" b="1" dirty="0" smtClean="0">
-                <a:latin typeface="微軟正黑體" panose="020B0604030504040204" pitchFamily="34" charset="-120"/>
-                <a:ea typeface="微軟正黑體" panose="020B0604030504040204" pitchFamily="34" charset="-120"/>
-              </a:rPr>
-              <a:t>A</a:t>
-            </a:r>
-            <a:r>
-              <a:rPr lang="zh-TW" altLang="en-US" sz="1800" b="1" dirty="0" smtClean="0">
-                <a:latin typeface="微軟正黑體" panose="020B0604030504040204" pitchFamily="34" charset="-120"/>
-                <a:ea typeface="微軟正黑體" panose="020B0604030504040204" pitchFamily="34" charset="-120"/>
-              </a:rPr>
-              <a:t>夢，在</a:t>
-            </a:r>
-            <a:r>
-              <a:rPr lang="en-US" altLang="zh-TW" sz="1800" b="1" dirty="0" smtClean="0">
-                <a:latin typeface="微軟正黑體" panose="020B0604030504040204" pitchFamily="34" charset="-120"/>
-                <a:ea typeface="微軟正黑體" panose="020B0604030504040204" pitchFamily="34" charset="-120"/>
-              </a:rPr>
-              <a:t>hog</a:t>
-            </a:r>
-            <a:r>
-              <a:rPr lang="zh-TW" altLang="en-US" sz="1800" b="1" dirty="0" smtClean="0">
-                <a:latin typeface="微軟正黑體" panose="020B0604030504040204" pitchFamily="34" charset="-120"/>
-                <a:ea typeface="微軟正黑體" panose="020B0604030504040204" pitchFamily="34" charset="-120"/>
-              </a:rPr>
-              <a:t>邊緣檢測中，我們得知由小貓與小狗的體型差不多，在</a:t>
-            </a:r>
-            <a:r>
-              <a:rPr lang="en-US" altLang="zh-TW" sz="1800" b="1" dirty="0" smtClean="0">
-                <a:latin typeface="微軟正黑體" panose="020B0604030504040204" pitchFamily="34" charset="-120"/>
-                <a:ea typeface="微軟正黑體" panose="020B0604030504040204" pitchFamily="34" charset="-120"/>
-              </a:rPr>
-              <a:t>HOG</a:t>
-            </a:r>
-            <a:r>
-              <a:rPr lang="zh-TW" altLang="en-US" sz="1800" b="1" dirty="0" smtClean="0">
-                <a:latin typeface="微軟正黑體" panose="020B0604030504040204" pitchFamily="34" charset="-120"/>
-                <a:ea typeface="微軟正黑體" panose="020B0604030504040204" pitchFamily="34" charset="-120"/>
-              </a:rPr>
-              <a:t>邊緣檢測中可能會有辨識錯誤的可能性。</a:t>
-            </a:r>
-            <a:endParaRPr lang="en-US" altLang="zh-TW" sz="1800" b="1" dirty="0" smtClean="0">
-              <a:latin typeface="微軟正黑體" panose="020B0604030504040204" pitchFamily="34" charset="-120"/>
-              <a:ea typeface="微軟正黑體" panose="020B0604030504040204" pitchFamily="34" charset="-120"/>
-            </a:endParaRPr>
-          </a:p>
-          <a:p>
-            <a:r>
-              <a:rPr lang="zh-TW" altLang="en-US" sz="1800" b="1" dirty="0" smtClean="0">
-                <a:latin typeface="微軟正黑體" panose="020B0604030504040204" pitchFamily="34" charset="-120"/>
-                <a:ea typeface="微軟正黑體" panose="020B0604030504040204" pitchFamily="34" charset="-120"/>
-              </a:rPr>
-              <a:t>於是我們這次在用</a:t>
+              <a:rPr lang="en" altLang="zh-TW" sz="1800" b="1" dirty="0" err="1">
+                <a:latin typeface="微軟正黑體" panose="020B0604030504040204" pitchFamily="34" charset="-120"/>
+                <a:ea typeface="微軟正黑體" panose="020B0604030504040204" pitchFamily="34" charset="-120"/>
+              </a:rPr>
+              <a:t>Kmean</a:t>
+            </a:r>
+            <a:r>
+              <a:rPr lang="en" altLang="zh-TW" sz="1800" b="1" dirty="0">
+                <a:latin typeface="微軟正黑體" panose="020B0604030504040204" pitchFamily="34" charset="-120"/>
+                <a:ea typeface="微軟正黑體" panose="020B0604030504040204" pitchFamily="34" charset="-120"/>
+              </a:rPr>
+              <a:t>(scikit) </a:t>
             </a:r>
             <a:r>
               <a:rPr lang="zh-TW" altLang="en-US" sz="1800" b="1" dirty="0">
                 <a:latin typeface="微軟正黑體" panose="020B0604030504040204" pitchFamily="34" charset="-120"/>
                 <a:ea typeface="微軟正黑體" panose="020B0604030504040204" pitchFamily="34" charset="-120"/>
               </a:rPr>
-              <a:t>名偵探柯南與哆啦</a:t>
-            </a:r>
-            <a:r>
-              <a:rPr lang="en-US" altLang="zh-TW" sz="1800" b="1" dirty="0">
-                <a:latin typeface="微軟正黑體" panose="020B0604030504040204" pitchFamily="34" charset="-120"/>
-                <a:ea typeface="微軟正黑體" panose="020B0604030504040204" pitchFamily="34" charset="-120"/>
-              </a:rPr>
-              <a:t>A</a:t>
-            </a:r>
-            <a:r>
-              <a:rPr lang="zh-TW" altLang="en-US" sz="1800" b="1" dirty="0" smtClean="0">
-                <a:latin typeface="微軟正黑體" panose="020B0604030504040204" pitchFamily="34" charset="-120"/>
-                <a:ea typeface="微軟正黑體" panose="020B0604030504040204" pitchFamily="34" charset="-120"/>
-              </a:rPr>
-              <a:t>夢來進行辨識，他們的輪廓並不相同，多拉</a:t>
-            </a:r>
-            <a:r>
-              <a:rPr lang="en-US" altLang="zh-TW" sz="1800" b="1" dirty="0" smtClean="0">
-                <a:latin typeface="微軟正黑體" panose="020B0604030504040204" pitchFamily="34" charset="-120"/>
-                <a:ea typeface="微軟正黑體" panose="020B0604030504040204" pitchFamily="34" charset="-120"/>
-              </a:rPr>
-              <a:t>A</a:t>
-            </a:r>
-            <a:r>
-              <a:rPr lang="zh-TW" altLang="en-US" sz="1800" b="1" dirty="0" smtClean="0">
-                <a:latin typeface="微軟正黑體" panose="020B0604030504040204" pitchFamily="34" charset="-120"/>
-                <a:ea typeface="微軟正黑體" panose="020B0604030504040204" pitchFamily="34" charset="-120"/>
-              </a:rPr>
-              <a:t>夢輪廓較為圓滑、名偵探柯南的輪廓偏瘦，我們想從這兩個資料集來獲得新的啟發。</a:t>
-            </a:r>
-            <a:endParaRPr lang="en-US" altLang="zh-TW" sz="1800" b="1" dirty="0" smtClean="0">
-              <a:latin typeface="微軟正黑體" panose="020B0604030504040204" pitchFamily="34" charset="-120"/>
-              <a:ea typeface="微軟正黑體" panose="020B0604030504040204" pitchFamily="34" charset="-120"/>
-            </a:endParaRPr>
-          </a:p>
-          <a:p>
-            <a:r>
-              <a:rPr lang="zh-TW" altLang="en-US" sz="1800" b="1" dirty="0" smtClean="0">
-                <a:latin typeface="微軟正黑體" panose="020B0604030504040204" pitchFamily="34" charset="-120"/>
-                <a:ea typeface="微軟正黑體" panose="020B0604030504040204" pitchFamily="34" charset="-120"/>
-              </a:rPr>
-              <a:t>且</a:t>
-            </a:r>
-            <a:r>
-              <a:rPr lang="en-US" altLang="zh-TW" sz="1800" b="1" dirty="0" smtClean="0">
-                <a:latin typeface="微軟正黑體" panose="020B0604030504040204" pitchFamily="34" charset="-120"/>
-                <a:ea typeface="微軟正黑體" panose="020B0604030504040204" pitchFamily="34" charset="-120"/>
-              </a:rPr>
-              <a:t>SIFT</a:t>
-            </a:r>
-            <a:r>
-              <a:rPr lang="zh-TW" altLang="en-US" sz="1800" b="1" dirty="0" smtClean="0">
-                <a:latin typeface="微軟正黑體" panose="020B0604030504040204" pitchFamily="34" charset="-120"/>
-                <a:ea typeface="微軟正黑體" panose="020B0604030504040204" pitchFamily="34" charset="-120"/>
-              </a:rPr>
-              <a:t>能保留</a:t>
-            </a:r>
-            <a:r>
-              <a:rPr lang="zh-TW" altLang="en-US" sz="1800" b="1" dirty="0" smtClean="0">
-                <a:solidFill>
-                  <a:srgbClr val="FF0000"/>
-                </a:solidFill>
-                <a:latin typeface="微軟正黑體" panose="020B0604030504040204" pitchFamily="34" charset="-120"/>
-                <a:ea typeface="微軟正黑體" panose="020B0604030504040204" pitchFamily="34" charset="-120"/>
-              </a:rPr>
-              <a:t>圖片獨特性、適合大量特徵</a:t>
-            </a:r>
-            <a:r>
-              <a:rPr lang="zh-TW" altLang="en-US" sz="1800" b="1" dirty="0" smtClean="0">
-                <a:latin typeface="微軟正黑體" panose="020B0604030504040204" pitchFamily="34" charset="-120"/>
-                <a:ea typeface="微軟正黑體" panose="020B0604030504040204" pitchFamily="34" charset="-120"/>
-              </a:rPr>
-              <a:t>，我們想知道</a:t>
-            </a:r>
-            <a:r>
-              <a:rPr lang="en-US" altLang="zh-TW" sz="1800" b="1" dirty="0" smtClean="0">
-                <a:latin typeface="微軟正黑體" panose="020B0604030504040204" pitchFamily="34" charset="-120"/>
-                <a:ea typeface="微軟正黑體" panose="020B0604030504040204" pitchFamily="34" charset="-120"/>
-              </a:rPr>
-              <a:t>SIFT</a:t>
-            </a:r>
-            <a:r>
-              <a:rPr lang="zh-TW" altLang="en-US" sz="1800" b="1" dirty="0" smtClean="0">
-                <a:latin typeface="微軟正黑體" panose="020B0604030504040204" pitchFamily="34" charset="-120"/>
-                <a:ea typeface="微軟正黑體" panose="020B0604030504040204" pitchFamily="34" charset="-120"/>
-              </a:rPr>
-              <a:t>保留的圖片獨特性、加上小狗與小貓的特徵較容易相同，名偵探柯南與哆啦</a:t>
-            </a:r>
-            <a:r>
-              <a:rPr lang="en-US" altLang="zh-TW" sz="1800" b="1" dirty="0" smtClean="0">
-                <a:latin typeface="微軟正黑體" panose="020B0604030504040204" pitchFamily="34" charset="-120"/>
-                <a:ea typeface="微軟正黑體" panose="020B0604030504040204" pitchFamily="34" charset="-120"/>
-              </a:rPr>
-              <a:t>A</a:t>
-            </a:r>
-            <a:r>
-              <a:rPr lang="zh-TW" altLang="en-US" sz="1800" b="1" dirty="0" smtClean="0">
-                <a:latin typeface="微軟正黑體" panose="020B0604030504040204" pitchFamily="34" charset="-120"/>
-                <a:ea typeface="微軟正黑體" panose="020B0604030504040204" pitchFamily="34" charset="-120"/>
-              </a:rPr>
-              <a:t>夢的特徵較不同，且多拉</a:t>
-            </a:r>
-            <a:r>
-              <a:rPr lang="en-US" altLang="zh-TW" sz="1800" b="1" dirty="0" smtClean="0">
-                <a:latin typeface="微軟正黑體" panose="020B0604030504040204" pitchFamily="34" charset="-120"/>
-                <a:ea typeface="微軟正黑體" panose="020B0604030504040204" pitchFamily="34" charset="-120"/>
-              </a:rPr>
-              <a:t>A</a:t>
-            </a:r>
-            <a:r>
-              <a:rPr lang="zh-TW" altLang="en-US" sz="1800" b="1" dirty="0" smtClean="0">
-                <a:latin typeface="微軟正黑體" panose="020B0604030504040204" pitchFamily="34" charset="-120"/>
-                <a:ea typeface="微軟正黑體" panose="020B0604030504040204" pitchFamily="34" charset="-120"/>
-              </a:rPr>
-              <a:t>夢有較多特徵點，想透過</a:t>
-            </a:r>
-            <a:r>
-              <a:rPr lang="en-US" altLang="zh-TW" sz="1800" b="1" dirty="0" smtClean="0">
-                <a:latin typeface="微軟正黑體" panose="020B0604030504040204" pitchFamily="34" charset="-120"/>
-                <a:ea typeface="微軟正黑體" panose="020B0604030504040204" pitchFamily="34" charset="-120"/>
-              </a:rPr>
-              <a:t>SIFT</a:t>
-            </a:r>
-            <a:r>
-              <a:rPr lang="zh-TW" altLang="en-US" sz="1800" b="1" dirty="0" smtClean="0">
-                <a:latin typeface="微軟正黑體" panose="020B0604030504040204" pitchFamily="34" charset="-120"/>
-                <a:ea typeface="微軟正黑體" panose="020B0604030504040204" pitchFamily="34" charset="-120"/>
-              </a:rPr>
-              <a:t>來讓機器辨識圖片，探討辨識是否成功。</a:t>
+              <a:t>和</a:t>
+            </a:r>
+            <a:r>
+              <a:rPr lang="en" altLang="zh-TW" sz="1800" b="1" dirty="0">
+                <a:latin typeface="微軟正黑體" panose="020B0604030504040204" pitchFamily="34" charset="-120"/>
+                <a:ea typeface="微軟正黑體" panose="020B0604030504040204" pitchFamily="34" charset="-120"/>
+              </a:rPr>
+              <a:t> </a:t>
+            </a:r>
+            <a:r>
+              <a:rPr lang="en" altLang="zh-TW" sz="1800" b="1" dirty="0" err="1">
+                <a:latin typeface="微軟正黑體" panose="020B0604030504040204" pitchFamily="34" charset="-120"/>
+                <a:ea typeface="微軟正黑體" panose="020B0604030504040204" pitchFamily="34" charset="-120"/>
+              </a:rPr>
+              <a:t>kmean</a:t>
+            </a:r>
+            <a:r>
+              <a:rPr lang="en" altLang="zh-TW" sz="1800" b="1" dirty="0">
+                <a:latin typeface="微軟正黑體" panose="020B0604030504040204" pitchFamily="34" charset="-120"/>
+                <a:ea typeface="微軟正黑體" panose="020B0604030504040204" pitchFamily="34" charset="-120"/>
+              </a:rPr>
+              <a:t>(</a:t>
+            </a:r>
+            <a:r>
+              <a:rPr lang="en" altLang="zh-TW" sz="1800" b="1" dirty="0" err="1">
+                <a:latin typeface="微軟正黑體" panose="020B0604030504040204" pitchFamily="34" charset="-120"/>
+                <a:ea typeface="微軟正黑體" panose="020B0604030504040204" pitchFamily="34" charset="-120"/>
+              </a:rPr>
+              <a:t>scipy</a:t>
+            </a:r>
+            <a:r>
+              <a:rPr lang="en" altLang="zh-TW" sz="1800" b="1" dirty="0">
+                <a:latin typeface="微軟正黑體" panose="020B0604030504040204" pitchFamily="34" charset="-120"/>
+                <a:ea typeface="微軟正黑體" panose="020B0604030504040204" pitchFamily="34" charset="-120"/>
+              </a:rPr>
+              <a:t>) </a:t>
+            </a:r>
+            <a:r>
+              <a:rPr lang="zh-TW" altLang="en-US" sz="1800" b="1" dirty="0">
+                <a:latin typeface="微軟正黑體" panose="020B0604030504040204" pitchFamily="34" charset="-120"/>
+                <a:ea typeface="微軟正黑體" panose="020B0604030504040204" pitchFamily="34" charset="-120"/>
+              </a:rPr>
+              <a:t>兩個雖然算法相同，但因為是不同套件包，內容參數不同。一開始沒有發現到此問題。後來又參考了講義上的程式碼，才改為</a:t>
+            </a:r>
+            <a:r>
+              <a:rPr lang="en" altLang="zh-TW" sz="1800" b="1" dirty="0" err="1">
+                <a:latin typeface="微軟正黑體" panose="020B0604030504040204" pitchFamily="34" charset="-120"/>
+                <a:ea typeface="微軟正黑體" panose="020B0604030504040204" pitchFamily="34" charset="-120"/>
+              </a:rPr>
+              <a:t>scipy</a:t>
+            </a:r>
+            <a:r>
+              <a:rPr lang="zh-TW" altLang="en-US" sz="1800" b="1" dirty="0">
+                <a:latin typeface="微軟正黑體" panose="020B0604030504040204" pitchFamily="34" charset="-120"/>
+                <a:ea typeface="微軟正黑體" panose="020B0604030504040204" pitchFamily="34" charset="-120"/>
+              </a:rPr>
+              <a:t>裡的</a:t>
+            </a:r>
+            <a:r>
+              <a:rPr lang="en-US" altLang="zh-TW" sz="1800" b="1" dirty="0" err="1">
+                <a:latin typeface="微軟正黑體" panose="020B0604030504040204" pitchFamily="34" charset="-120"/>
+                <a:ea typeface="微軟正黑體" panose="020B0604030504040204" pitchFamily="34" charset="-120"/>
+              </a:rPr>
+              <a:t>kmean</a:t>
             </a:r>
             <a:endParaRPr lang="zh-TW" altLang="en-US" sz="1800" b="1" dirty="0">
               <a:latin typeface="微軟正黑體" panose="020B0604030504040204" pitchFamily="34" charset="-120"/>
               <a:ea typeface="微軟正黑體" panose="020B0604030504040204" pitchFamily="34" charset="-120"/>
             </a:endParaRPr>
+          </a:p>
+          <a:p>
+            <a:r>
+              <a:rPr lang="zh-TW" altLang="en-US" sz="1800" b="1" dirty="0">
+                <a:latin typeface="微軟正黑體" panose="020B0604030504040204" pitchFamily="34" charset="-120"/>
+                <a:ea typeface="微軟正黑體" panose="020B0604030504040204" pitchFamily="34" charset="-120"/>
+              </a:rPr>
+              <a:t>目前的程式碼中做圖片辨識時，在兩次相同程式重複執行中，得到的結果卻不同</a:t>
+            </a:r>
+            <a:r>
+              <a:rPr lang="en-US" altLang="zh-TW" sz="1800" b="1" dirty="0">
+                <a:latin typeface="微軟正黑體" panose="020B0604030504040204" pitchFamily="34" charset="-120"/>
+                <a:ea typeface="微軟正黑體" panose="020B0604030504040204" pitchFamily="34" charset="-120"/>
+              </a:rPr>
+              <a:t>!</a:t>
+            </a:r>
+            <a:r>
+              <a:rPr lang="zh-TW" altLang="en-US" sz="1800" b="1" dirty="0">
+                <a:latin typeface="微軟正黑體" panose="020B0604030504040204" pitchFamily="34" charset="-120"/>
+                <a:ea typeface="微軟正黑體" panose="020B0604030504040204" pitchFamily="34" charset="-120"/>
+              </a:rPr>
+              <a:t>還未找到問題原因及解決方式</a:t>
+            </a:r>
           </a:p>
         </p:txBody>
       </p:sp>
@@ -8113,13 +7930,6 @@
   <p:clrMapOvr>
     <a:masterClrMapping/>
   </p:clrMapOvr>
-  <p:timing>
-    <p:tnLst>
-      <p:par>
-        <p:cTn id="1" dur="indefinite" restart="never" nodeType="tmRoot"/>
-      </p:par>
-    </p:tnLst>
-  </p:timing>
 </p:sld>
 </file>
 
@@ -8166,36 +7976,15 @@
               <a:t> </a:t>
             </a:r>
             <a:r>
-              <a:rPr lang="zh-TW" altLang="en-US" b="1" dirty="0" smtClean="0">
-                <a:solidFill>
-                  <a:srgbClr val="65463E"/>
-                </a:solidFill>
-                <a:latin typeface="微軟正黑體" panose="020B0604030504040204" pitchFamily="34" charset="-120"/>
-                <a:ea typeface="微軟正黑體" panose="020B0604030504040204" pitchFamily="34" charset="-120"/>
-              </a:rPr>
-              <a:t>資料集</a:t>
-            </a:r>
-            <a:r>
-              <a:rPr lang="en-US" altLang="zh-TW" b="1" dirty="0" smtClean="0">
-                <a:solidFill>
-                  <a:srgbClr val="65463E"/>
-                </a:solidFill>
-                <a:latin typeface="微軟正黑體" panose="020B0604030504040204" pitchFamily="34" charset="-120"/>
-                <a:ea typeface="微軟正黑體" panose="020B0604030504040204" pitchFamily="34" charset="-120"/>
-              </a:rPr>
-              <a:t>-</a:t>
-            </a:r>
-            <a:r>
-              <a:rPr lang="zh-TW" altLang="en-US" b="1" dirty="0" smtClean="0">
-                <a:solidFill>
-                  <a:srgbClr val="65463E"/>
-                </a:solidFill>
-                <a:latin typeface="微軟正黑體" panose="020B0604030504040204" pitchFamily="34" charset="-120"/>
-                <a:ea typeface="微軟正黑體" panose="020B0604030504040204" pitchFamily="34" charset="-120"/>
-              </a:rPr>
-              <a:t>貓與狗</a:t>
-            </a:r>
-            <a:endParaRPr lang="zh-TW" altLang="en-US" dirty="0"/>
+              <a:rPr lang="zh-TW" altLang="en-US" b="1" dirty="0">
+                <a:solidFill>
+                  <a:srgbClr val="2B4D89"/>
+                </a:solidFill>
+                <a:latin typeface="微軟正黑體" panose="020B0604030504040204" pitchFamily="34" charset="-120"/>
+                <a:ea typeface="微軟正黑體" panose="020B0604030504040204" pitchFamily="34" charset="-120"/>
+              </a:rPr>
+              <a:t>資料集的選擇</a:t>
+            </a:r>
           </a:p>
         </p:txBody>
       </p:sp>
@@ -8217,38 +8006,311 @@
           <a:lstStyle/>
           <a:p>
             <a:r>
+              <a:rPr lang="zh-TW" altLang="en-US" sz="1800" b="1" dirty="0">
+                <a:latin typeface="微軟正黑體" panose="020B0604030504040204" pitchFamily="34" charset="-120"/>
+                <a:ea typeface="微軟正黑體" panose="020B0604030504040204" pitchFamily="34" charset="-120"/>
+              </a:rPr>
+              <a:t>我們選擇兩組兩類別的資料集，一組是貓與狗，另一組是名偵探柯南與哆啦</a:t>
+            </a:r>
+            <a:r>
               <a:rPr lang="en-US" altLang="zh-TW" sz="1800" b="1" dirty="0">
                 <a:latin typeface="微軟正黑體" panose="020B0604030504040204" pitchFamily="34" charset="-120"/>
                 <a:ea typeface="微軟正黑體" panose="020B0604030504040204" pitchFamily="34" charset="-120"/>
+              </a:rPr>
+              <a:t>A</a:t>
+            </a:r>
+            <a:r>
+              <a:rPr lang="zh-TW" altLang="en-US" sz="1800" b="1" dirty="0">
+                <a:latin typeface="微軟正黑體" panose="020B0604030504040204" pitchFamily="34" charset="-120"/>
+                <a:ea typeface="微軟正黑體" panose="020B0604030504040204" pitchFamily="34" charset="-120"/>
+              </a:rPr>
+              <a:t>夢，在</a:t>
+            </a:r>
+            <a:r>
+              <a:rPr lang="en-US" altLang="zh-TW" sz="1800" b="1" dirty="0">
+                <a:latin typeface="微軟正黑體" panose="020B0604030504040204" pitchFamily="34" charset="-120"/>
+                <a:ea typeface="微軟正黑體" panose="020B0604030504040204" pitchFamily="34" charset="-120"/>
+              </a:rPr>
+              <a:t>hog</a:t>
+            </a:r>
+            <a:r>
+              <a:rPr lang="zh-TW" altLang="en-US" sz="1800" b="1" dirty="0">
+                <a:latin typeface="微軟正黑體" panose="020B0604030504040204" pitchFamily="34" charset="-120"/>
+                <a:ea typeface="微軟正黑體" panose="020B0604030504040204" pitchFamily="34" charset="-120"/>
+              </a:rPr>
+              <a:t>檢測中，我們得知由小貓與小狗的體型差不多，在</a:t>
+            </a:r>
+            <a:r>
+              <a:rPr lang="en-US" altLang="zh-TW" sz="1800" b="1" dirty="0">
+                <a:latin typeface="微軟正黑體" panose="020B0604030504040204" pitchFamily="34" charset="-120"/>
+                <a:ea typeface="微軟正黑體" panose="020B0604030504040204" pitchFamily="34" charset="-120"/>
+              </a:rPr>
+              <a:t>HOG</a:t>
+            </a:r>
+            <a:r>
+              <a:rPr lang="zh-TW" altLang="en-US" sz="1800" b="1" dirty="0">
+                <a:latin typeface="微軟正黑體" panose="020B0604030504040204" pitchFamily="34" charset="-120"/>
+                <a:ea typeface="微軟正黑體" panose="020B0604030504040204" pitchFamily="34" charset="-120"/>
+              </a:rPr>
+              <a:t>檢測中可能會有辨識錯誤的可能性。</a:t>
+            </a:r>
+            <a:endParaRPr lang="en-US" altLang="zh-TW" sz="1800" b="1" dirty="0">
+              <a:latin typeface="微軟正黑體" panose="020B0604030504040204" pitchFamily="34" charset="-120"/>
+              <a:ea typeface="微軟正黑體" panose="020B0604030504040204" pitchFamily="34" charset="-120"/>
+            </a:endParaRPr>
+          </a:p>
+          <a:p>
+            <a:r>
+              <a:rPr lang="zh-TW" altLang="en-US" sz="1800" b="1" dirty="0">
+                <a:latin typeface="微軟正黑體" panose="020B0604030504040204" pitchFamily="34" charset="-120"/>
+                <a:ea typeface="微軟正黑體" panose="020B0604030504040204" pitchFamily="34" charset="-120"/>
+              </a:rPr>
+              <a:t>於是我們這次用名偵探柯南與哆啦</a:t>
+            </a:r>
+            <a:r>
+              <a:rPr lang="en-US" altLang="zh-TW" sz="1800" b="1" dirty="0">
+                <a:latin typeface="微軟正黑體" panose="020B0604030504040204" pitchFamily="34" charset="-120"/>
+                <a:ea typeface="微軟正黑體" panose="020B0604030504040204" pitchFamily="34" charset="-120"/>
+              </a:rPr>
+              <a:t>A</a:t>
+            </a:r>
+            <a:r>
+              <a:rPr lang="zh-TW" altLang="en-US" sz="1800" b="1" dirty="0">
+                <a:latin typeface="微軟正黑體" panose="020B0604030504040204" pitchFamily="34" charset="-120"/>
+                <a:ea typeface="微軟正黑體" panose="020B0604030504040204" pitchFamily="34" charset="-120"/>
+              </a:rPr>
+              <a:t>夢來進行辨識，他們的輪廓並不相同，哆啦</a:t>
+            </a:r>
+            <a:r>
+              <a:rPr lang="en-US" altLang="zh-TW" sz="1800" b="1" dirty="0">
+                <a:latin typeface="微軟正黑體" panose="020B0604030504040204" pitchFamily="34" charset="-120"/>
+                <a:ea typeface="微軟正黑體" panose="020B0604030504040204" pitchFamily="34" charset="-120"/>
+              </a:rPr>
+              <a:t>A</a:t>
+            </a:r>
+            <a:r>
+              <a:rPr lang="zh-TW" altLang="en-US" sz="1800" b="1" dirty="0">
+                <a:latin typeface="微軟正黑體" panose="020B0604030504040204" pitchFamily="34" charset="-120"/>
+                <a:ea typeface="微軟正黑體" panose="020B0604030504040204" pitchFamily="34" charset="-120"/>
+              </a:rPr>
+              <a:t>夢輪廓較為圓滑、名偵探柯南的輪廓偏瘦，我們想從這兩個資料集來獲得新的啟發。</a:t>
+            </a:r>
+            <a:endParaRPr lang="en-US" altLang="zh-TW" sz="1800" b="1" dirty="0">
+              <a:latin typeface="微軟正黑體" panose="020B0604030504040204" pitchFamily="34" charset="-120"/>
+              <a:ea typeface="微軟正黑體" panose="020B0604030504040204" pitchFamily="34" charset="-120"/>
+            </a:endParaRPr>
+          </a:p>
+          <a:p>
+            <a:r>
+              <a:rPr lang="zh-TW" altLang="en-US" sz="1800" b="1" dirty="0">
+                <a:latin typeface="微軟正黑體" panose="020B0604030504040204" pitchFamily="34" charset="-120"/>
+                <a:ea typeface="微軟正黑體" panose="020B0604030504040204" pitchFamily="34" charset="-120"/>
+              </a:rPr>
+              <a:t>且</a:t>
+            </a:r>
+            <a:r>
+              <a:rPr lang="en-US" altLang="zh-TW" sz="1800" b="1" dirty="0">
+                <a:latin typeface="微軟正黑體" panose="020B0604030504040204" pitchFamily="34" charset="-120"/>
+                <a:ea typeface="微軟正黑體" panose="020B0604030504040204" pitchFamily="34" charset="-120"/>
+              </a:rPr>
+              <a:t>SIFT</a:t>
+            </a:r>
+            <a:r>
+              <a:rPr lang="zh-TW" altLang="en-US" sz="1800" b="1" dirty="0">
+                <a:latin typeface="微軟正黑體" panose="020B0604030504040204" pitchFamily="34" charset="-120"/>
+                <a:ea typeface="微軟正黑體" panose="020B0604030504040204" pitchFamily="34" charset="-120"/>
+              </a:rPr>
+              <a:t>能保留</a:t>
+            </a:r>
+            <a:r>
+              <a:rPr lang="zh-TW" altLang="en-US" sz="1800" b="1" dirty="0">
+                <a:solidFill>
+                  <a:srgbClr val="FF0000"/>
+                </a:solidFill>
+                <a:latin typeface="微軟正黑體" panose="020B0604030504040204" pitchFamily="34" charset="-120"/>
+                <a:ea typeface="微軟正黑體" panose="020B0604030504040204" pitchFamily="34" charset="-120"/>
+              </a:rPr>
+              <a:t>圖片獨特性、適合大量特徵</a:t>
+            </a:r>
+            <a:r>
+              <a:rPr lang="zh-TW" altLang="en-US" sz="1800" b="1" dirty="0">
+                <a:latin typeface="微軟正黑體" panose="020B0604030504040204" pitchFamily="34" charset="-120"/>
+                <a:ea typeface="微軟正黑體" panose="020B0604030504040204" pitchFamily="34" charset="-120"/>
+              </a:rPr>
+              <a:t>，我們想知道</a:t>
+            </a:r>
+            <a:r>
+              <a:rPr lang="en-US" altLang="zh-TW" sz="1800" b="1" dirty="0">
+                <a:latin typeface="微軟正黑體" panose="020B0604030504040204" pitchFamily="34" charset="-120"/>
+                <a:ea typeface="微軟正黑體" panose="020B0604030504040204" pitchFamily="34" charset="-120"/>
+              </a:rPr>
+              <a:t>SIFT</a:t>
+            </a:r>
+            <a:r>
+              <a:rPr lang="zh-TW" altLang="en-US" sz="1800" b="1" dirty="0">
+                <a:latin typeface="微軟正黑體" panose="020B0604030504040204" pitchFamily="34" charset="-120"/>
+                <a:ea typeface="微軟正黑體" panose="020B0604030504040204" pitchFamily="34" charset="-120"/>
+              </a:rPr>
+              <a:t>保留的圖片獨特性、加上小狗與小貓的特徵較容易相同，名偵探柯南與哆啦</a:t>
+            </a:r>
+            <a:r>
+              <a:rPr lang="en-US" altLang="zh-TW" sz="1800" b="1" dirty="0">
+                <a:latin typeface="微軟正黑體" panose="020B0604030504040204" pitchFamily="34" charset="-120"/>
+                <a:ea typeface="微軟正黑體" panose="020B0604030504040204" pitchFamily="34" charset="-120"/>
+              </a:rPr>
+              <a:t>A</a:t>
+            </a:r>
+            <a:r>
+              <a:rPr lang="zh-TW" altLang="en-US" sz="1800" b="1" dirty="0">
+                <a:latin typeface="微軟正黑體" panose="020B0604030504040204" pitchFamily="34" charset="-120"/>
+                <a:ea typeface="微軟正黑體" panose="020B0604030504040204" pitchFamily="34" charset="-120"/>
+              </a:rPr>
+              <a:t>夢的特徵較不同，且哆啦</a:t>
+            </a:r>
+            <a:r>
+              <a:rPr lang="en-US" altLang="zh-TW" sz="1800" b="1" dirty="0">
+                <a:latin typeface="微軟正黑體" panose="020B0604030504040204" pitchFamily="34" charset="-120"/>
+                <a:ea typeface="微軟正黑體" panose="020B0604030504040204" pitchFamily="34" charset="-120"/>
+              </a:rPr>
+              <a:t>A</a:t>
+            </a:r>
+            <a:r>
+              <a:rPr lang="zh-TW" altLang="en-US" sz="1800" b="1" dirty="0">
+                <a:latin typeface="微軟正黑體" panose="020B0604030504040204" pitchFamily="34" charset="-120"/>
+                <a:ea typeface="微軟正黑體" panose="020B0604030504040204" pitchFamily="34" charset="-120"/>
+              </a:rPr>
+              <a:t>夢有較多特徵點，想透過</a:t>
+            </a:r>
+            <a:r>
+              <a:rPr lang="en-US" altLang="zh-TW" sz="1800" b="1" dirty="0">
+                <a:latin typeface="微軟正黑體" panose="020B0604030504040204" pitchFamily="34" charset="-120"/>
+                <a:ea typeface="微軟正黑體" panose="020B0604030504040204" pitchFamily="34" charset="-120"/>
+              </a:rPr>
+              <a:t>SIFT</a:t>
+            </a:r>
+            <a:r>
+              <a:rPr lang="zh-TW" altLang="en-US" sz="1800" b="1" dirty="0">
+                <a:latin typeface="微軟正黑體" panose="020B0604030504040204" pitchFamily="34" charset="-120"/>
+                <a:ea typeface="微軟正黑體" panose="020B0604030504040204" pitchFamily="34" charset="-120"/>
+              </a:rPr>
+              <a:t>來讓機器辨識圖片，探討辨識是否成功。</a:t>
+            </a:r>
+          </a:p>
+        </p:txBody>
+      </p:sp>
+    </p:spTree>
+    <p:extLst>
+      <p:ext uri="{BB962C8B-B14F-4D97-AF65-F5344CB8AC3E}">
+        <p14:creationId xmlns:p14="http://schemas.microsoft.com/office/powerpoint/2010/main" val="2963864975"/>
+      </p:ext>
+    </p:extLst>
+  </p:cSld>
+  <p:clrMapOvr>
+    <a:masterClrMapping/>
+  </p:clrMapOvr>
+</p:sld>
+</file>
+
+<file path=ppt/slides/slide6.xml><?xml version="1.0" encoding="utf-8"?>
+<p:sld xmlns:a="http://schemas.openxmlformats.org/drawingml/2006/main" xmlns:r="http://schemas.openxmlformats.org/officeDocument/2006/relationships" xmlns:p="http://schemas.openxmlformats.org/presentationml/2006/main">
+  <p:cSld>
+    <p:spTree>
+      <p:nvGrpSpPr>
+        <p:cNvPr id="1" name=""/>
+        <p:cNvGrpSpPr/>
+        <p:nvPr/>
+      </p:nvGrpSpPr>
+      <p:grpSpPr>
+        <a:xfrm>
+          <a:off x="0" y="0"/>
+          <a:ext cx="0" cy="0"/>
+          <a:chOff x="0" y="0"/>
+          <a:chExt cx="0" cy="0"/>
+        </a:xfrm>
+      </p:grpSpPr>
+      <p:sp>
+        <p:nvSpPr>
+          <p:cNvPr id="2" name="標題 1"/>
+          <p:cNvSpPr>
+            <a:spLocks noGrp="1"/>
+          </p:cNvSpPr>
+          <p:nvPr>
+            <p:ph type="title"/>
+          </p:nvPr>
+        </p:nvSpPr>
+        <p:spPr/>
+        <p:txBody>
+          <a:bodyPr/>
+          <a:lstStyle/>
+          <a:p>
+            <a:r>
+              <a:rPr lang="zh-TW" altLang="en-US" b="1" dirty="0">
+                <a:solidFill>
+                  <a:srgbClr val="65463E"/>
+                </a:solidFill>
+                <a:latin typeface="微軟正黑體" panose="020B0604030504040204" pitchFamily="34" charset="-120"/>
+                <a:ea typeface="微軟正黑體" panose="020B0604030504040204" pitchFamily="34" charset="-120"/>
+              </a:rPr>
+              <a:t> 資料集</a:t>
+            </a:r>
+            <a:r>
+              <a:rPr lang="en-US" altLang="zh-TW" b="1" dirty="0">
+                <a:solidFill>
+                  <a:srgbClr val="65463E"/>
+                </a:solidFill>
+                <a:latin typeface="微軟正黑體" panose="020B0604030504040204" pitchFamily="34" charset="-120"/>
+                <a:ea typeface="微軟正黑體" panose="020B0604030504040204" pitchFamily="34" charset="-120"/>
+              </a:rPr>
+              <a:t>-</a:t>
+            </a:r>
+            <a:r>
+              <a:rPr lang="zh-TW" altLang="en-US" b="1" dirty="0">
+                <a:solidFill>
+                  <a:srgbClr val="65463E"/>
+                </a:solidFill>
+                <a:latin typeface="微軟正黑體" panose="020B0604030504040204" pitchFamily="34" charset="-120"/>
+                <a:ea typeface="微軟正黑體" panose="020B0604030504040204" pitchFamily="34" charset="-120"/>
+              </a:rPr>
+              <a:t>貓與狗</a:t>
+            </a:r>
+            <a:endParaRPr lang="zh-TW" altLang="en-US" dirty="0"/>
+          </a:p>
+        </p:txBody>
+      </p:sp>
+      <p:sp>
+        <p:nvSpPr>
+          <p:cNvPr id="3" name="內容版面配置區 2"/>
+          <p:cNvSpPr>
+            <a:spLocks noGrp="1"/>
+          </p:cNvSpPr>
+          <p:nvPr>
+            <p:ph sz="quarter" idx="13"/>
+          </p:nvPr>
+        </p:nvSpPr>
+        <p:spPr/>
+        <p:txBody>
+          <a:bodyPr>
+            <a:normAutofit/>
+          </a:bodyPr>
+          <a:lstStyle/>
+          <a:p>
+            <a:r>
+              <a:rPr lang="en-US" altLang="zh-TW" sz="1800" b="1" dirty="0">
+                <a:latin typeface="微軟正黑體" panose="020B0604030504040204" pitchFamily="34" charset="-120"/>
+                <a:ea typeface="微軟正黑體" panose="020B0604030504040204" pitchFamily="34" charset="-120"/>
                 <a:hlinkClick r:id="rId2"/>
               </a:rPr>
-              <a:t>Google </a:t>
-            </a:r>
-            <a:r>
-              <a:rPr lang="en-US" altLang="zh-TW" sz="1800" b="1" dirty="0" err="1">
+              <a:t>Google DriVE </a:t>
+            </a:r>
+            <a:r>
+              <a:rPr lang="zh-TW" altLang="en-US" sz="1800" b="1" dirty="0">
                 <a:latin typeface="微軟正黑體" panose="020B0604030504040204" pitchFamily="34" charset="-120"/>
                 <a:ea typeface="微軟正黑體" panose="020B0604030504040204" pitchFamily="34" charset="-120"/>
                 <a:hlinkClick r:id="rId2"/>
               </a:rPr>
-              <a:t>DriVE</a:t>
-            </a:r>
-            <a:r>
-              <a:rPr lang="en-US" altLang="zh-TW" sz="1800" b="1" dirty="0">
-                <a:latin typeface="微軟正黑體" panose="020B0604030504040204" pitchFamily="34" charset="-120"/>
-                <a:ea typeface="微軟正黑體" panose="020B0604030504040204" pitchFamily="34" charset="-120"/>
-                <a:hlinkClick r:id="rId2"/>
-              </a:rPr>
-              <a:t> </a:t>
-            </a:r>
-            <a:r>
-              <a:rPr lang="zh-TW" altLang="en-US" sz="1800" b="1" dirty="0" smtClean="0">
-                <a:latin typeface="微軟正黑體" panose="020B0604030504040204" pitchFamily="34" charset="-120"/>
-                <a:ea typeface="微軟正黑體" panose="020B0604030504040204" pitchFamily="34" charset="-120"/>
-                <a:hlinkClick r:id="rId2"/>
-              </a:rPr>
               <a:t>連結</a:t>
             </a:r>
-            <a:endParaRPr lang="en-US" altLang="zh-TW" sz="1800" b="1" dirty="0" smtClean="0">
+            <a:endParaRPr lang="en-US" altLang="zh-TW" sz="1800" b="1" dirty="0">
               <a:latin typeface="微軟正黑體" panose="020B0604030504040204" pitchFamily="34" charset="-120"/>
               <a:ea typeface="微軟正黑體" panose="020B0604030504040204" pitchFamily="34" charset="-120"/>
             </a:endParaRPr>
@@ -8400,17 +8462,10 @@
   <p:clrMapOvr>
     <a:masterClrMapping/>
   </p:clrMapOvr>
-  <p:timing>
-    <p:tnLst>
-      <p:par>
-        <p:cTn id="1" dur="indefinite" restart="never" nodeType="tmRoot"/>
-      </p:par>
-    </p:tnLst>
-  </p:timing>
 </p:sld>
 </file>
 
-<file path=ppt/slides/slide6.xml><?xml version="1.0" encoding="utf-8"?>
+<file path=ppt/slides/slide7.xml><?xml version="1.0" encoding="utf-8"?>
 <p:sld xmlns:a="http://schemas.openxmlformats.org/drawingml/2006/main" xmlns:r="http://schemas.openxmlformats.org/officeDocument/2006/relationships" xmlns:p="http://schemas.openxmlformats.org/presentationml/2006/main">
   <p:cSld>
     <p:spTree>
@@ -8453,7 +8508,7 @@
               <a:t> 資料集</a:t>
             </a:r>
             <a:r>
-              <a:rPr lang="en-US" altLang="zh-TW" b="1" dirty="0" smtClean="0">
+              <a:rPr lang="en-US" altLang="zh-TW" b="1" dirty="0">
                 <a:solidFill>
                   <a:srgbClr val="65463E"/>
                 </a:solidFill>
@@ -8463,17 +8518,17 @@
               <a:t>-</a:t>
             </a:r>
             <a:r>
-              <a:rPr lang="zh-TW" altLang="en-US" b="1" dirty="0" smtClean="0">
+              <a:rPr lang="zh-TW" altLang="en-US" b="1" dirty="0">
                 <a:solidFill>
                   <a:srgbClr val="65463E"/>
                 </a:solidFill>
                 <a:latin typeface="微軟正黑體" panose="020B0604030504040204" pitchFamily="34" charset="-120"/>
                 <a:ea typeface="微軟正黑體" panose="020B0604030504040204" pitchFamily="34" charset="-120"/>
               </a:rPr>
-              <a:t>多拉</a:t>
-            </a:r>
-            <a:r>
-              <a:rPr lang="en-US" altLang="zh-TW" b="1" dirty="0" smtClean="0">
+              <a:t>哆啦</a:t>
+            </a:r>
+            <a:r>
+              <a:rPr lang="en-US" altLang="zh-TW" b="1" dirty="0">
                 <a:solidFill>
                   <a:srgbClr val="65463E"/>
                 </a:solidFill>
@@ -8483,7 +8538,7 @@
               <a:t>A</a:t>
             </a:r>
             <a:r>
-              <a:rPr lang="zh-TW" altLang="en-US" b="1" smtClean="0">
+              <a:rPr lang="zh-TW" altLang="en-US" b="1" dirty="0">
                 <a:solidFill>
                   <a:srgbClr val="65463E"/>
                 </a:solidFill>
@@ -8675,222 +8730,6 @@
   <p:clrMapOvr>
     <a:masterClrMapping/>
   </p:clrMapOvr>
-  <p:timing>
-    <p:tnLst>
-      <p:par>
-        <p:cTn id="1" dur="indefinite" restart="never" nodeType="tmRoot"/>
-      </p:par>
-    </p:tnLst>
-  </p:timing>
-</p:sld>
-</file>
-
-<file path=ppt/slides/slide7.xml><?xml version="1.0" encoding="utf-8"?>
-<p:sld xmlns:a="http://schemas.openxmlformats.org/drawingml/2006/main" xmlns:r="http://schemas.openxmlformats.org/officeDocument/2006/relationships" xmlns:p="http://schemas.openxmlformats.org/presentationml/2006/main">
-  <p:cSld>
-    <p:spTree>
-      <p:nvGrpSpPr>
-        <p:cNvPr id="1" name=""/>
-        <p:cNvGrpSpPr/>
-        <p:nvPr/>
-      </p:nvGrpSpPr>
-      <p:grpSpPr>
-        <a:xfrm>
-          <a:off x="0" y="0"/>
-          <a:ext cx="0" cy="0"/>
-          <a:chOff x="0" y="0"/>
-          <a:chExt cx="0" cy="0"/>
-        </a:xfrm>
-      </p:grpSpPr>
-      <p:sp>
-        <p:nvSpPr>
-          <p:cNvPr id="2" name="標題 1"/>
-          <p:cNvSpPr>
-            <a:spLocks noGrp="1"/>
-          </p:cNvSpPr>
-          <p:nvPr>
-            <p:ph type="title"/>
-          </p:nvPr>
-        </p:nvSpPr>
-        <p:spPr/>
-        <p:txBody>
-          <a:bodyPr>
-            <a:normAutofit/>
-          </a:bodyPr>
-          <a:lstStyle/>
-          <a:p>
-            <a:r>
-              <a:rPr lang="en-US" altLang="zh-TW" b="1" cap="none" dirty="0" smtClean="0">
-                <a:solidFill>
-                  <a:srgbClr val="65463E"/>
-                </a:solidFill>
-                <a:latin typeface="微軟正黑體" panose="020B0604030504040204" pitchFamily="34" charset="-120"/>
-                <a:ea typeface="微軟正黑體" panose="020B0604030504040204" pitchFamily="34" charset="-120"/>
-              </a:rPr>
-              <a:t>Function</a:t>
-            </a:r>
-            <a:r>
-              <a:rPr lang="en-US" altLang="zh-TW" b="1" dirty="0" smtClean="0">
-                <a:solidFill>
-                  <a:srgbClr val="65463E"/>
-                </a:solidFill>
-                <a:latin typeface="微軟正黑體" panose="020B0604030504040204" pitchFamily="34" charset="-120"/>
-                <a:ea typeface="微軟正黑體" panose="020B0604030504040204" pitchFamily="34" charset="-120"/>
-              </a:rPr>
-              <a:t> </a:t>
-            </a:r>
-            <a:r>
-              <a:rPr lang="zh-TW" altLang="en-US" b="1" dirty="0" smtClean="0">
-                <a:solidFill>
-                  <a:srgbClr val="65463E"/>
-                </a:solidFill>
-                <a:latin typeface="微軟正黑體" panose="020B0604030504040204" pitchFamily="34" charset="-120"/>
-                <a:ea typeface="微軟正黑體" panose="020B0604030504040204" pitchFamily="34" charset="-120"/>
-              </a:rPr>
-              <a:t>程式碼</a:t>
-            </a:r>
-            <a:r>
-              <a:rPr lang="en-US" altLang="zh-TW" b="1" dirty="0">
-                <a:solidFill>
-                  <a:srgbClr val="65463E"/>
-                </a:solidFill>
-                <a:latin typeface="微軟正黑體" panose="020B0604030504040204" pitchFamily="34" charset="-120"/>
-                <a:ea typeface="微軟正黑體" panose="020B0604030504040204" pitchFamily="34" charset="-120"/>
-              </a:rPr>
-              <a:t> </a:t>
-            </a:r>
-            <a:r>
-              <a:rPr lang="en-US" altLang="zh-TW" b="1" cap="none" dirty="0" smtClean="0">
-                <a:solidFill>
-                  <a:srgbClr val="65463E"/>
-                </a:solidFill>
-                <a:latin typeface="微軟正黑體" panose="020B0604030504040204" pitchFamily="34" charset="-120"/>
-                <a:ea typeface="微軟正黑體" panose="020B0604030504040204" pitchFamily="34" charset="-120"/>
-              </a:rPr>
-              <a:t>Part</a:t>
-            </a:r>
-            <a:r>
-              <a:rPr lang="en-US" altLang="zh-TW" b="1" dirty="0" smtClean="0">
-                <a:solidFill>
-                  <a:srgbClr val="65463E"/>
-                </a:solidFill>
-                <a:latin typeface="微軟正黑體" panose="020B0604030504040204" pitchFamily="34" charset="-120"/>
-                <a:ea typeface="微軟正黑體" panose="020B0604030504040204" pitchFamily="34" charset="-120"/>
-              </a:rPr>
-              <a:t>1</a:t>
-            </a:r>
-            <a:endParaRPr lang="zh-TW" altLang="en-US" b="1" dirty="0">
-              <a:solidFill>
-                <a:srgbClr val="65463E"/>
-              </a:solidFill>
-              <a:latin typeface="微軟正黑體" panose="020B0604030504040204" pitchFamily="34" charset="-120"/>
-              <a:ea typeface="微軟正黑體" panose="020B0604030504040204" pitchFamily="34" charset="-120"/>
-            </a:endParaRPr>
-          </a:p>
-        </p:txBody>
-      </p:sp>
-      <p:sp>
-        <p:nvSpPr>
-          <p:cNvPr id="3" name="內容版面配置區 2"/>
-          <p:cNvSpPr>
-            <a:spLocks noGrp="1"/>
-          </p:cNvSpPr>
-          <p:nvPr>
-            <p:ph sz="quarter" idx="13"/>
-          </p:nvPr>
-        </p:nvSpPr>
-        <p:spPr>
-          <a:xfrm>
-            <a:off x="913775" y="1947992"/>
-            <a:ext cx="10363826" cy="3424107"/>
-          </a:xfrm>
-        </p:spPr>
-        <p:txBody>
-          <a:bodyPr/>
-          <a:lstStyle/>
-          <a:p>
-            <a:r>
-              <a:rPr lang="zh-TW" altLang="en-US" sz="1800" b="1" dirty="0">
-                <a:latin typeface="微軟正黑體" panose="020B0604030504040204" pitchFamily="34" charset="-120"/>
-                <a:ea typeface="微軟正黑體" panose="020B0604030504040204" pitchFamily="34" charset="-120"/>
-              </a:rPr>
-              <a:t>由於裡面會有大量的重複程式碼，於是我就將重複的部分寫成</a:t>
-            </a:r>
-            <a:r>
-              <a:rPr lang="en-US" altLang="zh-TW" sz="1800" b="1" dirty="0">
-                <a:latin typeface="微軟正黑體" panose="020B0604030504040204" pitchFamily="34" charset="-120"/>
-                <a:ea typeface="微軟正黑體" panose="020B0604030504040204" pitchFamily="34" charset="-120"/>
-              </a:rPr>
-              <a:t>Function</a:t>
-            </a:r>
-            <a:r>
-              <a:rPr lang="zh-TW" altLang="en-US" sz="1800" b="1" dirty="0">
-                <a:latin typeface="微軟正黑體" panose="020B0604030504040204" pitchFamily="34" charset="-120"/>
-                <a:ea typeface="微軟正黑體" panose="020B0604030504040204" pitchFamily="34" charset="-120"/>
-              </a:rPr>
-              <a:t>，方便除錯也讓程式碼更加整潔。</a:t>
-            </a:r>
-            <a:endParaRPr lang="en-US" altLang="zh-TW" sz="1800" b="1" dirty="0">
-              <a:latin typeface="微軟正黑體" panose="020B0604030504040204" pitchFamily="34" charset="-120"/>
-              <a:ea typeface="微軟正黑體" panose="020B0604030504040204" pitchFamily="34" charset="-120"/>
-            </a:endParaRPr>
-          </a:p>
-          <a:p>
-            <a:endParaRPr lang="zh-TW" altLang="en-US" sz="1800" cap="none" dirty="0"/>
-          </a:p>
-        </p:txBody>
-      </p:sp>
-      <p:pic>
-        <p:nvPicPr>
-          <p:cNvPr id="7" name="圖片 6"/>
-          <p:cNvPicPr>
-            <a:picLocks noChangeAspect="1"/>
-          </p:cNvPicPr>
-          <p:nvPr/>
-        </p:nvPicPr>
-        <p:blipFill>
-          <a:blip r:embed="rId2"/>
-          <a:stretch>
-            <a:fillRect/>
-          </a:stretch>
-        </p:blipFill>
-        <p:spPr>
-          <a:xfrm>
-            <a:off x="1224800" y="2687653"/>
-            <a:ext cx="5304997" cy="3783012"/>
-          </a:xfrm>
-          <a:prstGeom prst="rect">
-            <a:avLst/>
-          </a:prstGeom>
-          <a:ln>
-            <a:noFill/>
-          </a:ln>
-          <a:effectLst>
-            <a:outerShdw blurRad="292100" dist="139700" dir="2700000" algn="tl" rotWithShape="0">
-              <a:srgbClr val="333333">
-                <a:alpha val="65000"/>
-              </a:srgbClr>
-            </a:outerShdw>
-          </a:effectLst>
-        </p:spPr>
-      </p:pic>
-    </p:spTree>
-    <p:extLst>
-      <p:ext uri="{BB962C8B-B14F-4D97-AF65-F5344CB8AC3E}">
-        <p14:creationId xmlns:p14="http://schemas.microsoft.com/office/powerpoint/2010/main" val="2770391295"/>
-      </p:ext>
-    </p:extLst>
-  </p:cSld>
-  <p:clrMapOvr>
-    <a:masterClrMapping/>
-  </p:clrMapOvr>
-  <p:timing>
-    <p:tnLst>
-      <p:par>
-        <p:cTn id="1" dur="indefinite" restart="never" nodeType="tmRoot"/>
-      </p:par>
-    </p:tnLst>
-  </p:timing>
 </p:sld>
 </file>
 
@@ -8969,7 +8808,7 @@
               <a:t> </a:t>
             </a:r>
             <a:r>
-              <a:rPr lang="en-US" altLang="zh-TW" b="1" cap="none" dirty="0" smtClean="0">
+              <a:rPr lang="en-US" altLang="zh-TW" b="1" cap="none" dirty="0">
                 <a:solidFill>
                   <a:srgbClr val="65463E"/>
                 </a:solidFill>
@@ -8979,14 +8818,14 @@
               <a:t>Part</a:t>
             </a:r>
             <a:r>
-              <a:rPr lang="en-US" altLang="zh-TW" b="1" dirty="0" smtClean="0">
+              <a:rPr lang="en-US" altLang="zh-TW" b="1" dirty="0">
                 <a:solidFill>
                   <a:srgbClr val="65463E"/>
                 </a:solidFill>
                 <a:latin typeface="微軟正黑體" panose="020B0604030504040204" pitchFamily="34" charset="-120"/>
                 <a:ea typeface="微軟正黑體" panose="020B0604030504040204" pitchFamily="34" charset="-120"/>
               </a:rPr>
-              <a:t>2</a:t>
+              <a:t>1</a:t>
             </a:r>
             <a:endParaRPr lang="zh-TW" altLang="en-US" b="1" dirty="0">
               <a:solidFill>
@@ -9019,32 +8858,39 @@
           <a:lstStyle/>
           <a:p>
             <a:r>
-              <a:rPr lang="zh-TW" altLang="en-US" sz="1800" b="1" cap="none" dirty="0" smtClean="0">
-                <a:ea typeface="微軟正黑體" panose="020B0604030504040204" pitchFamily="34" charset="-120"/>
-              </a:rPr>
-              <a:t>將每個 </a:t>
-            </a:r>
-            <a:r>
-              <a:rPr lang="en-US" altLang="zh-TW" sz="1800" b="1" cap="none" dirty="0" smtClean="0">
-                <a:ea typeface="微軟正黑體" panose="020B0604030504040204" pitchFamily="34" charset="-120"/>
-              </a:rPr>
-              <a:t>function</a:t>
-            </a:r>
-            <a:r>
-              <a:rPr lang="zh-TW" altLang="en-US" sz="1800" b="1" cap="none" dirty="0" smtClean="0">
-                <a:ea typeface="微軟正黑體" panose="020B0604030504040204" pitchFamily="34" charset="-120"/>
-              </a:rPr>
-              <a:t> 拆開貼上，會比較好閱讀。</a:t>
-            </a:r>
-            <a:endParaRPr lang="zh-TW" altLang="en-US" sz="1800" b="1" cap="none" dirty="0">
+              <a:rPr lang="zh-TW" altLang="en-US" sz="1800" b="1" dirty="0">
+                <a:latin typeface="微軟正黑體" panose="020B0604030504040204" pitchFamily="34" charset="-120"/>
+                <a:ea typeface="微軟正黑體" panose="020B0604030504040204" pitchFamily="34" charset="-120"/>
+              </a:rPr>
+              <a:t>由於裡面會有大量的重複程式碼，於是我就將重複的部分寫成</a:t>
+            </a:r>
+            <a:r>
+              <a:rPr lang="en-US" altLang="zh-TW" sz="1800" b="1" dirty="0">
+                <a:latin typeface="微軟正黑體" panose="020B0604030504040204" pitchFamily="34" charset="-120"/>
+                <a:ea typeface="微軟正黑體" panose="020B0604030504040204" pitchFamily="34" charset="-120"/>
+              </a:rPr>
+              <a:t>Function</a:t>
+            </a:r>
+            <a:r>
+              <a:rPr lang="zh-TW" altLang="en-US" sz="1800" b="1" dirty="0">
+                <a:latin typeface="微軟正黑體" panose="020B0604030504040204" pitchFamily="34" charset="-120"/>
+                <a:ea typeface="微軟正黑體" panose="020B0604030504040204" pitchFamily="34" charset="-120"/>
+              </a:rPr>
+              <a:t>，方便除錯也讓程式碼更加整潔。</a:t>
+            </a:r>
+            <a:endParaRPr lang="en-US" altLang="zh-TW" sz="1800" b="1" dirty="0">
+              <a:latin typeface="微軟正黑體" panose="020B0604030504040204" pitchFamily="34" charset="-120"/>
               <a:ea typeface="微軟正黑體" panose="020B0604030504040204" pitchFamily="34" charset="-120"/>
             </a:endParaRPr>
           </a:p>
+          <a:p>
+            <a:endParaRPr lang="zh-TW" altLang="en-US" sz="1800" cap="none" dirty="0"/>
+          </a:p>
         </p:txBody>
       </p:sp>
       <p:pic>
         <p:nvPicPr>
-          <p:cNvPr id="5" name="圖片 4"/>
+          <p:cNvPr id="7" name="圖片 6"/>
           <p:cNvPicPr>
             <a:picLocks noChangeAspect="1"/>
           </p:cNvPicPr>
@@ -9058,8 +8904,8 @@
         </p:blipFill>
         <p:spPr>
           <a:xfrm>
-            <a:off x="913150" y="2429300"/>
-            <a:ext cx="6753225" cy="1638300"/>
+            <a:off x="1224800" y="2687653"/>
+            <a:ext cx="5304997" cy="3783012"/>
           </a:xfrm>
           <a:prstGeom prst="rect">
             <a:avLst/>
@@ -9079,20 +8925,13 @@
     </p:spTree>
     <p:extLst>
       <p:ext uri="{BB962C8B-B14F-4D97-AF65-F5344CB8AC3E}">
-        <p14:creationId xmlns:p14="http://schemas.microsoft.com/office/powerpoint/2010/main" val="1989387377"/>
+        <p14:creationId xmlns:p14="http://schemas.microsoft.com/office/powerpoint/2010/main" val="2770391295"/>
       </p:ext>
     </p:extLst>
   </p:cSld>
   <p:clrMapOvr>
     <a:masterClrMapping/>
   </p:clrMapOvr>
-  <p:timing>
-    <p:tnLst>
-      <p:par>
-        <p:cTn id="1" dur="indefinite" restart="never" nodeType="tmRoot"/>
-      </p:par>
-    </p:tnLst>
-  </p:timing>
 </p:sld>
 </file>
 
@@ -9130,7 +8969,6 @@
           </a:bodyPr>
           <a:lstStyle/>
           <a:p>
-            <a:pPr algn="l"/>
             <a:r>
               <a:rPr lang="en-US" altLang="zh-TW" b="1" cap="none" dirty="0">
                 <a:solidFill>
@@ -9172,7 +9010,7 @@
               <a:t> </a:t>
             </a:r>
             <a:r>
-              <a:rPr lang="en-US" altLang="zh-TW" b="1" cap="none" dirty="0" smtClean="0">
+              <a:rPr lang="en-US" altLang="zh-TW" b="1" cap="none" dirty="0">
                 <a:solidFill>
                   <a:srgbClr val="65463E"/>
                 </a:solidFill>
@@ -9189,7 +9027,7 @@
                 <a:latin typeface="微軟正黑體" panose="020B0604030504040204" pitchFamily="34" charset="-120"/>
                 <a:ea typeface="微軟正黑體" panose="020B0604030504040204" pitchFamily="34" charset="-120"/>
               </a:rPr>
-              <a:t>3</a:t>
+              <a:t>2</a:t>
             </a:r>
             <a:endParaRPr lang="zh-TW" altLang="en-US" b="1" dirty="0">
               <a:solidFill>
@@ -9221,13 +9059,30 @@
           <a:bodyPr/>
           <a:lstStyle/>
           <a:p>
-            <a:endParaRPr lang="zh-TW" altLang="en-US" sz="1800" cap="none" dirty="0"/>
+            <a:r>
+              <a:rPr lang="zh-TW" altLang="en-US" sz="1800" b="1" cap="none" dirty="0">
+                <a:ea typeface="微軟正黑體" panose="020B0604030504040204" pitchFamily="34" charset="-120"/>
+              </a:rPr>
+              <a:t>將每個 </a:t>
+            </a:r>
+            <a:r>
+              <a:rPr lang="en-US" altLang="zh-TW" sz="1800" b="1" cap="none" dirty="0">
+                <a:ea typeface="微軟正黑體" panose="020B0604030504040204" pitchFamily="34" charset="-120"/>
+              </a:rPr>
+              <a:t>function</a:t>
+            </a:r>
+            <a:r>
+              <a:rPr lang="zh-TW" altLang="en-US" sz="1800" b="1" cap="none" dirty="0">
+                <a:ea typeface="微軟正黑體" panose="020B0604030504040204" pitchFamily="34" charset="-120"/>
+              </a:rPr>
+              <a:t> 拆開貼上，會比較好閱讀。</a:t>
+            </a:r>
           </a:p>
         </p:txBody>
       </p:sp>
       <p:pic>
         <p:nvPicPr>
-          <p:cNvPr id="6" name="圖片 5"/>
+          <p:cNvPr id="5" name="圖片 4"/>
           <p:cNvPicPr>
             <a:picLocks noChangeAspect="1"/>
           </p:cNvPicPr>
@@ -9241,8 +9096,8 @@
         </p:blipFill>
         <p:spPr>
           <a:xfrm>
-            <a:off x="1211494" y="1828800"/>
-            <a:ext cx="6926254" cy="4793673"/>
+            <a:off x="913150" y="2429300"/>
+            <a:ext cx="6753225" cy="1638300"/>
           </a:xfrm>
           <a:prstGeom prst="rect">
             <a:avLst/>
@@ -9262,20 +9117,13 @@
     </p:spTree>
     <p:extLst>
       <p:ext uri="{BB962C8B-B14F-4D97-AF65-F5344CB8AC3E}">
-        <p14:creationId xmlns:p14="http://schemas.microsoft.com/office/powerpoint/2010/main" val="955177461"/>
+        <p14:creationId xmlns:p14="http://schemas.microsoft.com/office/powerpoint/2010/main" val="1989387377"/>
       </p:ext>
     </p:extLst>
   </p:cSld>
   <p:clrMapOvr>
     <a:masterClrMapping/>
   </p:clrMapOvr>
-  <p:timing>
-    <p:tnLst>
-      <p:par>
-        <p:cTn id="1" dur="indefinite" restart="never" nodeType="tmRoot"/>
-      </p:par>
-    </p:tnLst>
-  </p:timing>
 </p:sld>
 </file>
 

</xml_diff>